<commit_message>
red pen :) - adding quiz to slides
</commit_message>
<xml_diff>
--- a/nlp-tensorflow/slides.pptx
+++ b/nlp-tensorflow/slides.pptx
@@ -8,7 +8,7 @@
     <p:sldMasterId id="2147485227" r:id="rId4"/>
   </p:sldMasterIdLst>
   <p:notesMasterIdLst>
-    <p:notesMasterId r:id="rId20"/>
+    <p:notesMasterId r:id="rId30"/>
   </p:notesMasterIdLst>
   <p:sldIdLst>
     <p:sldId id="258" r:id="rId5"/>
@@ -23,14 +23,24 @@
     <p:sldId id="278" r:id="rId14"/>
     <p:sldId id="282" r:id="rId15"/>
     <p:sldId id="290" r:id="rId16"/>
-    <p:sldId id="298" r:id="rId17"/>
-    <p:sldId id="300" r:id="rId18"/>
-    <p:sldId id="302" r:id="rId19"/>
+    <p:sldId id="304" r:id="rId17"/>
+    <p:sldId id="280" r:id="rId18"/>
+    <p:sldId id="305" r:id="rId19"/>
+    <p:sldId id="284" r:id="rId20"/>
+    <p:sldId id="286" r:id="rId21"/>
+    <p:sldId id="288" r:id="rId22"/>
+    <p:sldId id="306" r:id="rId23"/>
+    <p:sldId id="292" r:id="rId24"/>
+    <p:sldId id="294" r:id="rId25"/>
+    <p:sldId id="296" r:id="rId26"/>
+    <p:sldId id="298" r:id="rId27"/>
+    <p:sldId id="300" r:id="rId28"/>
+    <p:sldId id="302" r:id="rId29"/>
   </p:sldIdLst>
   <p:sldSz cx="12192000" cy="6858000"/>
   <p:notesSz cx="6858000" cy="9144000"/>
   <p:custDataLst>
-    <p:tags r:id="rId21"/>
+    <p:tags r:id="rId31"/>
   </p:custDataLst>
   <p:defaultTextStyle>
     <a:defPPr>
@@ -227,7 +237,7 @@
           </a:lstStyle>
           <a:p>
             <a:fld id="{19E1345C-1308-4214-8862-636E5C13336D}" type="datetimeFigureOut">
-              <a:t>2/3/2022</a:t>
+              <a:t>2/4/22</a:t>
             </a:fld>
             <a:endParaRPr/>
           </a:p>
@@ -643,7 +653,7 @@
           <a:p>
             <a:fld id="{6101C5E1-D8E9-464D-A93E-CE21651935A7}" type="slidenum">
               <a:rPr lang="en-US" smtClean="0"/>
-              <a:t>13</a:t>
+              <a:t>11</a:t>
             </a:fld>
             <a:endParaRPr lang="en-US"/>
           </a:p>
@@ -731,7 +741,7 @@
           <a:p>
             <a:fld id="{6101C5E1-D8E9-464D-A93E-CE21651935A7}" type="slidenum">
               <a:rPr lang="en-US" smtClean="0"/>
-              <a:t>17</a:t>
+              <a:t>12</a:t>
             </a:fld>
             <a:endParaRPr lang="en-US"/>
           </a:p>
@@ -772,12 +782,7 @@
             <p:ph type="sldImg"/>
           </p:nvPr>
         </p:nvSpPr>
-        <p:spPr>
-          <a:xfrm>
-            <a:off x="685800" y="1143000"/>
-            <a:ext cx="5486400" cy="3086100"/>
-          </a:xfrm>
-        </p:spPr>
+        <p:spPr/>
       </p:sp>
       <p:sp>
         <p:nvSpPr>
@@ -796,7 +801,9 @@
           </a:bodyPr>
           <a:lstStyle/>
           <a:p>
-            <a:endParaRPr/>
+            <a:r>
+              <a:t>Explanation: This is correct</a:t>
+            </a:r>
           </a:p>
         </p:txBody>
       </p:sp>
@@ -817,7 +824,7 @@
           <a:p>
             <a:fld id="{6101C5E1-D8E9-464D-A93E-CE21651935A7}" type="slidenum">
               <a:rPr lang="en-US" smtClean="0"/>
-              <a:t>21</a:t>
+              <a:t>13</a:t>
             </a:fld>
             <a:endParaRPr lang="en-US"/>
           </a:p>
@@ -858,12 +865,7 @@
             <p:ph type="sldImg"/>
           </p:nvPr>
         </p:nvSpPr>
-        <p:spPr>
-          <a:xfrm>
-            <a:off x="685800" y="1143000"/>
-            <a:ext cx="5486400" cy="3086100"/>
-          </a:xfrm>
-        </p:spPr>
+        <p:spPr/>
       </p:sp>
       <p:sp>
         <p:nvSpPr>
@@ -878,95 +880,12 @@
         <p:spPr/>
         <p:txBody>
           <a:bodyPr>
-            <a:normAutofit fontScale="95000" lnSpcReduction="20000"/>
+            <a:normAutofit/>
           </a:bodyPr>
           <a:lstStyle/>
           <a:p>
-            <a:pPr>
-              <a:spcBef>
-                <a:spcPct val="43750"/>
-              </a:spcBef>
-              <a:spcAft>
-                <a:spcPct val="43750"/>
-              </a:spcAft>
-            </a:pPr>
-            <a:r>
-              <a:t>In this Learn Module, we have covered all the basics of Natural Language Processing such as: text representation, traditional recurrent network models, and near state-of-the-art models with attention. We were focusing mostly on text classification and did not discuss in detail other important tasks like named entity recognition, machine translation and question answering. To implement those tasks, the same basic RNN principles are used with a different top layer architecture. To get a more complete understanding of the NLP field, you should experiment with some of those problems as well.</a:t>
-            </a:r>
-          </a:p>
-          <a:p>
-            <a:endParaRPr/>
-          </a:p>
-          <a:p>
-            <a:pPr>
-              <a:spcBef>
-                <a:spcPct val="43750"/>
-              </a:spcBef>
-              <a:spcAft>
-                <a:spcPct val="43750"/>
-              </a:spcAft>
-            </a:pPr>
-            <a:r>
-              <a:t>One of the other emerging areas of NLP is model visualization and probing. This direction is also known as </a:t>
-            </a:r>
-            <a:r>
-              <a:rPr>
-                <a:hlinkClick r:id="rId3"/>
-              </a:rPr>
-              <a:t>BERTology</a:t>
-            </a:r>
-            <a:r>
-              <a:t>. As we have seen in the previous unit, visualizing attention matrix can tell us a lot about how machine translation works and where the model "looks" when translating a word. There are other powerful methods of understanding BERT internals.</a:t>
-            </a:r>
-          </a:p>
-          <a:p>
-            <a:endParaRPr/>
-          </a:p>
-          <a:p>
-            <a:pPr>
-              <a:spcBef>
-                <a:spcPct val="43750"/>
-              </a:spcBef>
-              <a:spcAft>
-                <a:spcPct val="43750"/>
-              </a:spcAft>
-            </a:pPr>
-            <a:r>
-              <a:t>The latest text generative models, such as GPT-2/3, are slightly different from BERT, in a sense that they can be "programmed" to solve different tasks just by providing an "initial sequence" for text generation. This could lead to a possible paradigm shift where instead of doing transfer learning training we would be focusing on creating suitable questions for giant pre-trained networks. If you want to get really serious about NLP, you probably need to explore some of the latest text generative models, such as </a:t>
-            </a:r>
-            <a:r>
-              <a:rPr>
-                <a:hlinkClick r:id="rId4"/>
-              </a:rPr>
-              <a:t>GPT-2</a:t>
-            </a:r>
-            <a:r>
-              <a:t>, or </a:t>
-            </a:r>
-            <a:r>
-              <a:rPr>
-                <a:hlinkClick r:id="rId5"/>
-              </a:rPr>
-              <a:t>Microsoft Turing NLG</a:t>
-            </a:r>
-            <a:r>
-              <a:t>.</a:t>
-            </a:r>
-          </a:p>
-          <a:p>
-            <a:endParaRPr/>
-          </a:p>
-          <a:p>
-            <a:pPr>
-              <a:spcBef>
-                <a:spcPct val="43750"/>
-              </a:spcBef>
-              <a:spcAft>
-                <a:spcPct val="43750"/>
-              </a:spcAft>
-            </a:pPr>
-            <a:r>
-              <a:t>Now you have the basics to get started on any natural language task!</a:t>
+            <a:r>
+              <a:t>Explanation: This is correct</a:t>
             </a:r>
           </a:p>
         </p:txBody>
@@ -988,7 +907,505 @@
           <a:p>
             <a:fld id="{6101C5E1-D8E9-464D-A93E-CE21651935A7}" type="slidenum">
               <a:rPr lang="en-US" smtClean="0"/>
-              <a:t>22</a:t>
+              <a:t>14</a:t>
+            </a:fld>
+            <a:endParaRPr lang="en-US"/>
+          </a:p>
+        </p:txBody>
+      </p:sp>
+    </p:spTree>
+  </p:cSld>
+  <p:clrMapOvr>
+    <a:masterClrMapping/>
+  </p:clrMapOvr>
+</p:notes>
+</file>
+
+<file path=ppt/notesSlides/notesSlide14.xml><?xml version="1.0" encoding="utf-8"?>
+<p:notes xmlns:a="http://schemas.openxmlformats.org/drawingml/2006/main" xmlns:r="http://schemas.openxmlformats.org/officeDocument/2006/relationships" xmlns:p="http://schemas.openxmlformats.org/presentationml/2006/main">
+  <p:cSld>
+    <p:spTree>
+      <p:nvGrpSpPr>
+        <p:cNvPr id="1" name=""/>
+        <p:cNvGrpSpPr/>
+        <p:nvPr/>
+      </p:nvGrpSpPr>
+      <p:grpSpPr>
+        <a:xfrm>
+          <a:off x="0" y="0"/>
+          <a:ext cx="0" cy="0"/>
+          <a:chOff x="0" y="0"/>
+          <a:chExt cx="0" cy="0"/>
+        </a:xfrm>
+      </p:grpSpPr>
+      <p:sp>
+        <p:nvSpPr>
+          <p:cNvPr id="2" name="Slide Image Placeholder 1"/>
+          <p:cNvSpPr>
+            <a:spLocks noGrp="1" noRot="1" noChangeAspect="1"/>
+          </p:cNvSpPr>
+          <p:nvPr>
+            <p:ph type="sldImg"/>
+          </p:nvPr>
+        </p:nvSpPr>
+        <p:spPr/>
+      </p:sp>
+      <p:sp>
+        <p:nvSpPr>
+          <p:cNvPr id="3" name="Notes Placeholder 2"/>
+          <p:cNvSpPr>
+            <a:spLocks noGrp="1"/>
+          </p:cNvSpPr>
+          <p:nvPr>
+            <p:ph type="body" idx="1"/>
+          </p:nvPr>
+        </p:nvSpPr>
+        <p:spPr/>
+        <p:txBody>
+          <a:bodyPr>
+            <a:normAutofit/>
+          </a:bodyPr>
+          <a:lstStyle/>
+          <a:p>
+            <a:r>
+              <a:t>Explanation: Correct, character-level LSTM will capture often used syllables and will put those patterns together to generate new words.</a:t>
+            </a:r>
+          </a:p>
+        </p:txBody>
+      </p:sp>
+      <p:sp>
+        <p:nvSpPr>
+          <p:cNvPr id="4" name="Slide Number Placeholder 3"/>
+          <p:cNvSpPr>
+            <a:spLocks noGrp="1"/>
+          </p:cNvSpPr>
+          <p:nvPr>
+            <p:ph type="sldNum" sz="quarter" idx="10"/>
+          </p:nvPr>
+        </p:nvSpPr>
+        <p:spPr/>
+        <p:txBody>
+          <a:bodyPr/>
+          <a:lstStyle/>
+          <a:p>
+            <a:fld id="{6101C5E1-D8E9-464D-A93E-CE21651935A7}" type="slidenum">
+              <a:rPr lang="en-US" smtClean="0"/>
+              <a:t>15</a:t>
+            </a:fld>
+            <a:endParaRPr lang="en-US"/>
+          </a:p>
+        </p:txBody>
+      </p:sp>
+    </p:spTree>
+  </p:cSld>
+  <p:clrMapOvr>
+    <a:masterClrMapping/>
+  </p:clrMapOvr>
+</p:notes>
+</file>
+
+<file path=ppt/notesSlides/notesSlide15.xml><?xml version="1.0" encoding="utf-8"?>
+<p:notes xmlns:a="http://schemas.openxmlformats.org/drawingml/2006/main" xmlns:r="http://schemas.openxmlformats.org/officeDocument/2006/relationships" xmlns:p="http://schemas.openxmlformats.org/presentationml/2006/main">
+  <p:cSld>
+    <p:spTree>
+      <p:nvGrpSpPr>
+        <p:cNvPr id="1" name=""/>
+        <p:cNvGrpSpPr/>
+        <p:nvPr/>
+      </p:nvGrpSpPr>
+      <p:grpSpPr>
+        <a:xfrm>
+          <a:off x="0" y="0"/>
+          <a:ext cx="0" cy="0"/>
+          <a:chOff x="0" y="0"/>
+          <a:chExt cx="0" cy="0"/>
+        </a:xfrm>
+      </p:grpSpPr>
+      <p:sp>
+        <p:nvSpPr>
+          <p:cNvPr id="2" name="Slide Image Placeholder 1"/>
+          <p:cNvSpPr>
+            <a:spLocks noGrp="1" noRot="1" noChangeAspect="1"/>
+          </p:cNvSpPr>
+          <p:nvPr>
+            <p:ph type="sldImg"/>
+          </p:nvPr>
+        </p:nvSpPr>
+        <p:spPr/>
+      </p:sp>
+      <p:sp>
+        <p:nvSpPr>
+          <p:cNvPr id="3" name="Notes Placeholder 2"/>
+          <p:cNvSpPr>
+            <a:spLocks noGrp="1"/>
+          </p:cNvSpPr>
+          <p:nvPr>
+            <p:ph type="body" idx="1"/>
+          </p:nvPr>
+        </p:nvSpPr>
+        <p:spPr/>
+        <p:txBody>
+          <a:bodyPr>
+            <a:normAutofit/>
+          </a:bodyPr>
+          <a:lstStyle/>
+          <a:p>
+            <a:r>
+              <a:t>Explanation: Correct, character-level LSTM will capture often used syllables and will put those patterns together to generate new words.</a:t>
+            </a:r>
+          </a:p>
+        </p:txBody>
+      </p:sp>
+      <p:sp>
+        <p:nvSpPr>
+          <p:cNvPr id="4" name="Slide Number Placeholder 3"/>
+          <p:cNvSpPr>
+            <a:spLocks noGrp="1"/>
+          </p:cNvSpPr>
+          <p:nvPr>
+            <p:ph type="sldNum" sz="quarter" idx="10"/>
+          </p:nvPr>
+        </p:nvSpPr>
+        <p:spPr/>
+        <p:txBody>
+          <a:bodyPr/>
+          <a:lstStyle/>
+          <a:p>
+            <a:fld id="{6101C5E1-D8E9-464D-A93E-CE21651935A7}" type="slidenum">
+              <a:rPr lang="en-US" smtClean="0"/>
+              <a:t>16</a:t>
+            </a:fld>
+            <a:endParaRPr lang="en-US"/>
+          </a:p>
+        </p:txBody>
+      </p:sp>
+    </p:spTree>
+  </p:cSld>
+  <p:clrMapOvr>
+    <a:masterClrMapping/>
+  </p:clrMapOvr>
+</p:notes>
+</file>
+
+<file path=ppt/notesSlides/notesSlide16.xml><?xml version="1.0" encoding="utf-8"?>
+<p:notes xmlns:a="http://schemas.openxmlformats.org/drawingml/2006/main" xmlns:r="http://schemas.openxmlformats.org/officeDocument/2006/relationships" xmlns:p="http://schemas.openxmlformats.org/presentationml/2006/main">
+  <p:cSld>
+    <p:spTree>
+      <p:nvGrpSpPr>
+        <p:cNvPr id="1" name=""/>
+        <p:cNvGrpSpPr/>
+        <p:nvPr/>
+      </p:nvGrpSpPr>
+      <p:grpSpPr>
+        <a:xfrm>
+          <a:off x="0" y="0"/>
+          <a:ext cx="0" cy="0"/>
+          <a:chOff x="0" y="0"/>
+          <a:chExt cx="0" cy="0"/>
+        </a:xfrm>
+      </p:grpSpPr>
+      <p:sp>
+        <p:nvSpPr>
+          <p:cNvPr id="2" name="Slide Image Placeholder 1"/>
+          <p:cNvSpPr>
+            <a:spLocks noGrp="1" noRot="1" noChangeAspect="1"/>
+          </p:cNvSpPr>
+          <p:nvPr>
+            <p:ph type="sldImg"/>
+          </p:nvPr>
+        </p:nvSpPr>
+        <p:spPr/>
+      </p:sp>
+      <p:sp>
+        <p:nvSpPr>
+          <p:cNvPr id="3" name="Notes Placeholder 2"/>
+          <p:cNvSpPr>
+            <a:spLocks noGrp="1"/>
+          </p:cNvSpPr>
+          <p:nvPr>
+            <p:ph type="body" idx="1"/>
+          </p:nvPr>
+        </p:nvSpPr>
+        <p:spPr/>
+        <p:txBody>
+          <a:bodyPr>
+            <a:normAutofit/>
+          </a:bodyPr>
+          <a:lstStyle/>
+          <a:p>
+            <a:r>
+              <a:t>Explanation: This is correct.</a:t>
+            </a:r>
+          </a:p>
+        </p:txBody>
+      </p:sp>
+      <p:sp>
+        <p:nvSpPr>
+          <p:cNvPr id="4" name="Slide Number Placeholder 3"/>
+          <p:cNvSpPr>
+            <a:spLocks noGrp="1"/>
+          </p:cNvSpPr>
+          <p:nvPr>
+            <p:ph type="sldNum" sz="quarter" idx="10"/>
+          </p:nvPr>
+        </p:nvSpPr>
+        <p:spPr/>
+        <p:txBody>
+          <a:bodyPr/>
+          <a:lstStyle/>
+          <a:p>
+            <a:fld id="{6101C5E1-D8E9-464D-A93E-CE21651935A7}" type="slidenum">
+              <a:rPr lang="en-US" smtClean="0"/>
+              <a:t>17</a:t>
+            </a:fld>
+            <a:endParaRPr lang="en-US"/>
+          </a:p>
+        </p:txBody>
+      </p:sp>
+    </p:spTree>
+  </p:cSld>
+  <p:clrMapOvr>
+    <a:masterClrMapping/>
+  </p:clrMapOvr>
+</p:notes>
+</file>
+
+<file path=ppt/notesSlides/notesSlide17.xml><?xml version="1.0" encoding="utf-8"?>
+<p:notes xmlns:a="http://schemas.openxmlformats.org/drawingml/2006/main" xmlns:r="http://schemas.openxmlformats.org/officeDocument/2006/relationships" xmlns:p="http://schemas.openxmlformats.org/presentationml/2006/main">
+  <p:cSld>
+    <p:spTree>
+      <p:nvGrpSpPr>
+        <p:cNvPr id="1" name=""/>
+        <p:cNvGrpSpPr/>
+        <p:nvPr/>
+      </p:nvGrpSpPr>
+      <p:grpSpPr>
+        <a:xfrm>
+          <a:off x="0" y="0"/>
+          <a:ext cx="0" cy="0"/>
+          <a:chOff x="0" y="0"/>
+          <a:chExt cx="0" cy="0"/>
+        </a:xfrm>
+      </p:grpSpPr>
+      <p:sp>
+        <p:nvSpPr>
+          <p:cNvPr id="2" name="Slide Image Placeholder 1"/>
+          <p:cNvSpPr>
+            <a:spLocks noGrp="1" noRot="1" noChangeAspect="1"/>
+          </p:cNvSpPr>
+          <p:nvPr>
+            <p:ph type="sldImg"/>
+          </p:nvPr>
+        </p:nvSpPr>
+        <p:spPr/>
+      </p:sp>
+      <p:sp>
+        <p:nvSpPr>
+          <p:cNvPr id="3" name="Notes Placeholder 2"/>
+          <p:cNvSpPr>
+            <a:spLocks noGrp="1"/>
+          </p:cNvSpPr>
+          <p:nvPr>
+            <p:ph type="body" idx="1"/>
+          </p:nvPr>
+        </p:nvSpPr>
+        <p:spPr/>
+        <p:txBody>
+          <a:bodyPr>
+            <a:normAutofit/>
+          </a:bodyPr>
+          <a:lstStyle/>
+          <a:p>
+            <a:r>
+              <a:t>Explanation: This is correct.</a:t>
+            </a:r>
+          </a:p>
+        </p:txBody>
+      </p:sp>
+      <p:sp>
+        <p:nvSpPr>
+          <p:cNvPr id="4" name="Slide Number Placeholder 3"/>
+          <p:cNvSpPr>
+            <a:spLocks noGrp="1"/>
+          </p:cNvSpPr>
+          <p:nvPr>
+            <p:ph type="sldNum" sz="quarter" idx="10"/>
+          </p:nvPr>
+        </p:nvSpPr>
+        <p:spPr/>
+        <p:txBody>
+          <a:bodyPr/>
+          <a:lstStyle/>
+          <a:p>
+            <a:fld id="{6101C5E1-D8E9-464D-A93E-CE21651935A7}" type="slidenum">
+              <a:rPr lang="en-US" smtClean="0"/>
+              <a:t>18</a:t>
+            </a:fld>
+            <a:endParaRPr lang="en-US"/>
+          </a:p>
+        </p:txBody>
+      </p:sp>
+    </p:spTree>
+  </p:cSld>
+  <p:clrMapOvr>
+    <a:masterClrMapping/>
+  </p:clrMapOvr>
+</p:notes>
+</file>
+
+<file path=ppt/notesSlides/notesSlide18.xml><?xml version="1.0" encoding="utf-8"?>
+<p:notes xmlns:a="http://schemas.openxmlformats.org/drawingml/2006/main" xmlns:r="http://schemas.openxmlformats.org/officeDocument/2006/relationships" xmlns:p="http://schemas.openxmlformats.org/presentationml/2006/main">
+  <p:cSld>
+    <p:spTree>
+      <p:nvGrpSpPr>
+        <p:cNvPr id="1" name=""/>
+        <p:cNvGrpSpPr/>
+        <p:nvPr/>
+      </p:nvGrpSpPr>
+      <p:grpSpPr>
+        <a:xfrm>
+          <a:off x="0" y="0"/>
+          <a:ext cx="0" cy="0"/>
+          <a:chOff x="0" y="0"/>
+          <a:chExt cx="0" cy="0"/>
+        </a:xfrm>
+      </p:grpSpPr>
+      <p:sp>
+        <p:nvSpPr>
+          <p:cNvPr id="2" name="Slide Image Placeholder 1"/>
+          <p:cNvSpPr>
+            <a:spLocks noGrp="1" noRot="1" noChangeAspect="1"/>
+          </p:cNvSpPr>
+          <p:nvPr>
+            <p:ph type="sldImg"/>
+          </p:nvPr>
+        </p:nvSpPr>
+        <p:spPr/>
+      </p:sp>
+      <p:sp>
+        <p:nvSpPr>
+          <p:cNvPr id="3" name="Notes Placeholder 2"/>
+          <p:cNvSpPr>
+            <a:spLocks noGrp="1"/>
+          </p:cNvSpPr>
+          <p:nvPr>
+            <p:ph type="body" idx="1"/>
+          </p:nvPr>
+        </p:nvSpPr>
+        <p:spPr/>
+        <p:txBody>
+          <a:bodyPr>
+            <a:normAutofit/>
+          </a:bodyPr>
+          <a:lstStyle/>
+          <a:p>
+            <a:r>
+              <a:t>Explanation: In LSTM, each block receives and outputs a state, which is manipulated upon inside the block depending on input and previous state.</a:t>
+            </a:r>
+          </a:p>
+        </p:txBody>
+      </p:sp>
+      <p:sp>
+        <p:nvSpPr>
+          <p:cNvPr id="4" name="Slide Number Placeholder 3"/>
+          <p:cNvSpPr>
+            <a:spLocks noGrp="1"/>
+          </p:cNvSpPr>
+          <p:nvPr>
+            <p:ph type="sldNum" sz="quarter" idx="10"/>
+          </p:nvPr>
+        </p:nvSpPr>
+        <p:spPr/>
+        <p:txBody>
+          <a:bodyPr/>
+          <a:lstStyle/>
+          <a:p>
+            <a:fld id="{6101C5E1-D8E9-464D-A93E-CE21651935A7}" type="slidenum">
+              <a:rPr lang="en-US" smtClean="0"/>
+              <a:t>19</a:t>
+            </a:fld>
+            <a:endParaRPr lang="en-US"/>
+          </a:p>
+        </p:txBody>
+      </p:sp>
+    </p:spTree>
+  </p:cSld>
+  <p:clrMapOvr>
+    <a:masterClrMapping/>
+  </p:clrMapOvr>
+</p:notes>
+</file>
+
+<file path=ppt/notesSlides/notesSlide19.xml><?xml version="1.0" encoding="utf-8"?>
+<p:notes xmlns:a="http://schemas.openxmlformats.org/drawingml/2006/main" xmlns:r="http://schemas.openxmlformats.org/officeDocument/2006/relationships" xmlns:p="http://schemas.openxmlformats.org/presentationml/2006/main">
+  <p:cSld>
+    <p:spTree>
+      <p:nvGrpSpPr>
+        <p:cNvPr id="1" name=""/>
+        <p:cNvGrpSpPr/>
+        <p:nvPr/>
+      </p:nvGrpSpPr>
+      <p:grpSpPr>
+        <a:xfrm>
+          <a:off x="0" y="0"/>
+          <a:ext cx="0" cy="0"/>
+          <a:chOff x="0" y="0"/>
+          <a:chExt cx="0" cy="0"/>
+        </a:xfrm>
+      </p:grpSpPr>
+      <p:sp>
+        <p:nvSpPr>
+          <p:cNvPr id="2" name="Slide Image Placeholder 1"/>
+          <p:cNvSpPr>
+            <a:spLocks noGrp="1" noRot="1" noChangeAspect="1"/>
+          </p:cNvSpPr>
+          <p:nvPr>
+            <p:ph type="sldImg"/>
+          </p:nvPr>
+        </p:nvSpPr>
+        <p:spPr/>
+      </p:sp>
+      <p:sp>
+        <p:nvSpPr>
+          <p:cNvPr id="3" name="Notes Placeholder 2"/>
+          <p:cNvSpPr>
+            <a:spLocks noGrp="1"/>
+          </p:cNvSpPr>
+          <p:nvPr>
+            <p:ph type="body" idx="1"/>
+          </p:nvPr>
+        </p:nvSpPr>
+        <p:spPr/>
+        <p:txBody>
+          <a:bodyPr>
+            <a:normAutofit/>
+          </a:bodyPr>
+          <a:lstStyle/>
+          <a:p>
+            <a:r>
+              <a:t>Explanation: In LSTM, each block receives and outputs a state, which is manipulated upon inside the block depending on input and previous state.</a:t>
+            </a:r>
+          </a:p>
+        </p:txBody>
+      </p:sp>
+      <p:sp>
+        <p:nvSpPr>
+          <p:cNvPr id="4" name="Slide Number Placeholder 3"/>
+          <p:cNvSpPr>
+            <a:spLocks noGrp="1"/>
+          </p:cNvSpPr>
+          <p:nvPr>
+            <p:ph type="sldNum" sz="quarter" idx="10"/>
+          </p:nvPr>
+        </p:nvSpPr>
+        <p:spPr/>
+        <p:txBody>
+          <a:bodyPr/>
+          <a:lstStyle/>
+          <a:p>
+            <a:fld id="{6101C5E1-D8E9-464D-A93E-CE21651935A7}" type="slidenum">
+              <a:rPr lang="en-US" smtClean="0"/>
+              <a:t>20</a:t>
             </a:fld>
             <a:endParaRPr lang="en-US"/>
           </a:p>
@@ -1088,6 +1505,429 @@
 </p:notes>
 </file>
 
+<file path=ppt/notesSlides/notesSlide20.xml><?xml version="1.0" encoding="utf-8"?>
+<p:notes xmlns:a="http://schemas.openxmlformats.org/drawingml/2006/main" xmlns:r="http://schemas.openxmlformats.org/officeDocument/2006/relationships" xmlns:p="http://schemas.openxmlformats.org/presentationml/2006/main">
+  <p:cSld>
+    <p:spTree>
+      <p:nvGrpSpPr>
+        <p:cNvPr id="1" name=""/>
+        <p:cNvGrpSpPr/>
+        <p:nvPr/>
+      </p:nvGrpSpPr>
+      <p:grpSpPr>
+        <a:xfrm>
+          <a:off x="0" y="0"/>
+          <a:ext cx="0" cy="0"/>
+          <a:chOff x="0" y="0"/>
+          <a:chExt cx="0" cy="0"/>
+        </a:xfrm>
+      </p:grpSpPr>
+      <p:sp>
+        <p:nvSpPr>
+          <p:cNvPr id="2" name="Slide Image Placeholder 1"/>
+          <p:cNvSpPr>
+            <a:spLocks noGrp="1" noRot="1" noChangeAspect="1"/>
+          </p:cNvSpPr>
+          <p:nvPr>
+            <p:ph type="sldImg"/>
+          </p:nvPr>
+        </p:nvSpPr>
+        <p:spPr/>
+      </p:sp>
+      <p:sp>
+        <p:nvSpPr>
+          <p:cNvPr id="3" name="Notes Placeholder 2"/>
+          <p:cNvSpPr>
+            <a:spLocks noGrp="1"/>
+          </p:cNvSpPr>
+          <p:nvPr>
+            <p:ph type="body" idx="1"/>
+          </p:nvPr>
+        </p:nvSpPr>
+        <p:spPr/>
+        <p:txBody>
+          <a:bodyPr>
+            <a:normAutofit/>
+          </a:bodyPr>
+          <a:lstStyle/>
+          <a:p>
+            <a:r>
+              <a:t>Explanation: Correct. By looking at attention matrix we can visually estimate which words play more important role in different parts of the sentence.</a:t>
+            </a:r>
+          </a:p>
+        </p:txBody>
+      </p:sp>
+      <p:sp>
+        <p:nvSpPr>
+          <p:cNvPr id="4" name="Slide Number Placeholder 3"/>
+          <p:cNvSpPr>
+            <a:spLocks noGrp="1"/>
+          </p:cNvSpPr>
+          <p:nvPr>
+            <p:ph type="sldNum" sz="quarter" idx="10"/>
+          </p:nvPr>
+        </p:nvSpPr>
+        <p:spPr/>
+        <p:txBody>
+          <a:bodyPr/>
+          <a:lstStyle/>
+          <a:p>
+            <a:fld id="{6101C5E1-D8E9-464D-A93E-CE21651935A7}" type="slidenum">
+              <a:rPr lang="en-US" smtClean="0"/>
+              <a:t>21</a:t>
+            </a:fld>
+            <a:endParaRPr lang="en-US"/>
+          </a:p>
+        </p:txBody>
+      </p:sp>
+    </p:spTree>
+  </p:cSld>
+  <p:clrMapOvr>
+    <a:masterClrMapping/>
+  </p:clrMapOvr>
+</p:notes>
+</file>
+
+<file path=ppt/notesSlides/notesSlide21.xml><?xml version="1.0" encoding="utf-8"?>
+<p:notes xmlns:a="http://schemas.openxmlformats.org/drawingml/2006/main" xmlns:r="http://schemas.openxmlformats.org/officeDocument/2006/relationships" xmlns:p="http://schemas.openxmlformats.org/presentationml/2006/main">
+  <p:cSld>
+    <p:spTree>
+      <p:nvGrpSpPr>
+        <p:cNvPr id="1" name=""/>
+        <p:cNvGrpSpPr/>
+        <p:nvPr/>
+      </p:nvGrpSpPr>
+      <p:grpSpPr>
+        <a:xfrm>
+          <a:off x="0" y="0"/>
+          <a:ext cx="0" cy="0"/>
+          <a:chOff x="0" y="0"/>
+          <a:chExt cx="0" cy="0"/>
+        </a:xfrm>
+      </p:grpSpPr>
+      <p:sp>
+        <p:nvSpPr>
+          <p:cNvPr id="2" name="Slide Image Placeholder 1"/>
+          <p:cNvSpPr>
+            <a:spLocks noGrp="1" noRot="1" noChangeAspect="1"/>
+          </p:cNvSpPr>
+          <p:nvPr>
+            <p:ph type="sldImg"/>
+          </p:nvPr>
+        </p:nvSpPr>
+        <p:spPr/>
+      </p:sp>
+      <p:sp>
+        <p:nvSpPr>
+          <p:cNvPr id="3" name="Notes Placeholder 2"/>
+          <p:cNvSpPr>
+            <a:spLocks noGrp="1"/>
+          </p:cNvSpPr>
+          <p:nvPr>
+            <p:ph type="body" idx="1"/>
+          </p:nvPr>
+        </p:nvSpPr>
+        <p:spPr/>
+        <p:txBody>
+          <a:bodyPr>
+            <a:normAutofit/>
+          </a:bodyPr>
+          <a:lstStyle/>
+          <a:p>
+            <a:r>
+              <a:t>Explanation: Correct. By looking at attention matrix we can visually estimate which words play more important role in different parts of the sentence.</a:t>
+            </a:r>
+          </a:p>
+        </p:txBody>
+      </p:sp>
+      <p:sp>
+        <p:nvSpPr>
+          <p:cNvPr id="4" name="Slide Number Placeholder 3"/>
+          <p:cNvSpPr>
+            <a:spLocks noGrp="1"/>
+          </p:cNvSpPr>
+          <p:nvPr>
+            <p:ph type="sldNum" sz="quarter" idx="10"/>
+          </p:nvPr>
+        </p:nvSpPr>
+        <p:spPr/>
+        <p:txBody>
+          <a:bodyPr/>
+          <a:lstStyle/>
+          <a:p>
+            <a:fld id="{6101C5E1-D8E9-464D-A93E-CE21651935A7}" type="slidenum">
+              <a:rPr lang="en-US" smtClean="0"/>
+              <a:t>22</a:t>
+            </a:fld>
+            <a:endParaRPr lang="en-US"/>
+          </a:p>
+        </p:txBody>
+      </p:sp>
+    </p:spTree>
+  </p:cSld>
+  <p:clrMapOvr>
+    <a:masterClrMapping/>
+  </p:clrMapOvr>
+</p:notes>
+</file>
+
+<file path=ppt/notesSlides/notesSlide22.xml><?xml version="1.0" encoding="utf-8"?>
+<p:notes xmlns:a="http://schemas.openxmlformats.org/drawingml/2006/main" xmlns:r="http://schemas.openxmlformats.org/officeDocument/2006/relationships" xmlns:p="http://schemas.openxmlformats.org/presentationml/2006/main">
+  <p:cSld>
+    <p:spTree>
+      <p:nvGrpSpPr>
+        <p:cNvPr id="1" name=""/>
+        <p:cNvGrpSpPr/>
+        <p:nvPr/>
+      </p:nvGrpSpPr>
+      <p:grpSpPr>
+        <a:xfrm>
+          <a:off x="0" y="0"/>
+          <a:ext cx="0" cy="0"/>
+          <a:chOff x="0" y="0"/>
+          <a:chExt cx="0" cy="0"/>
+        </a:xfrm>
+      </p:grpSpPr>
+      <p:sp>
+        <p:nvSpPr>
+          <p:cNvPr id="2" name="Slide Image Placeholder 1"/>
+          <p:cNvSpPr>
+            <a:spLocks noGrp="1" noRot="1" noChangeAspect="1"/>
+          </p:cNvSpPr>
+          <p:nvPr>
+            <p:ph type="sldImg"/>
+          </p:nvPr>
+        </p:nvSpPr>
+        <p:spPr>
+          <a:xfrm>
+            <a:off x="685800" y="1143000"/>
+            <a:ext cx="5486400" cy="3086100"/>
+          </a:xfrm>
+        </p:spPr>
+      </p:sp>
+      <p:sp>
+        <p:nvSpPr>
+          <p:cNvPr id="3" name="Notes Placeholder 2"/>
+          <p:cNvSpPr>
+            <a:spLocks noGrp="1"/>
+          </p:cNvSpPr>
+          <p:nvPr>
+            <p:ph type="body" idx="1"/>
+          </p:nvPr>
+        </p:nvSpPr>
+        <p:spPr/>
+        <p:txBody>
+          <a:bodyPr>
+            <a:normAutofit/>
+          </a:bodyPr>
+          <a:lstStyle/>
+          <a:p>
+            <a:endParaRPr/>
+          </a:p>
+        </p:txBody>
+      </p:sp>
+      <p:sp>
+        <p:nvSpPr>
+          <p:cNvPr id="4" name="Slide Number Placeholder 3"/>
+          <p:cNvSpPr>
+            <a:spLocks noGrp="1"/>
+          </p:cNvSpPr>
+          <p:nvPr>
+            <p:ph type="sldNum" sz="quarter" idx="10"/>
+          </p:nvPr>
+        </p:nvSpPr>
+        <p:spPr/>
+        <p:txBody>
+          <a:bodyPr/>
+          <a:lstStyle/>
+          <a:p>
+            <a:fld id="{6101C5E1-D8E9-464D-A93E-CE21651935A7}" type="slidenum">
+              <a:rPr lang="en-US" smtClean="0"/>
+              <a:t>23</a:t>
+            </a:fld>
+            <a:endParaRPr lang="en-US"/>
+          </a:p>
+        </p:txBody>
+      </p:sp>
+    </p:spTree>
+  </p:cSld>
+  <p:clrMapOvr>
+    <a:masterClrMapping/>
+  </p:clrMapOvr>
+</p:notes>
+</file>
+
+<file path=ppt/notesSlides/notesSlide23.xml><?xml version="1.0" encoding="utf-8"?>
+<p:notes xmlns:a="http://schemas.openxmlformats.org/drawingml/2006/main" xmlns:r="http://schemas.openxmlformats.org/officeDocument/2006/relationships" xmlns:p="http://schemas.openxmlformats.org/presentationml/2006/main">
+  <p:cSld>
+    <p:spTree>
+      <p:nvGrpSpPr>
+        <p:cNvPr id="1" name=""/>
+        <p:cNvGrpSpPr/>
+        <p:nvPr/>
+      </p:nvGrpSpPr>
+      <p:grpSpPr>
+        <a:xfrm>
+          <a:off x="0" y="0"/>
+          <a:ext cx="0" cy="0"/>
+          <a:chOff x="0" y="0"/>
+          <a:chExt cx="0" cy="0"/>
+        </a:xfrm>
+      </p:grpSpPr>
+      <p:sp>
+        <p:nvSpPr>
+          <p:cNvPr id="2" name="Slide Image Placeholder 1"/>
+          <p:cNvSpPr>
+            <a:spLocks noGrp="1" noRot="1" noChangeAspect="1"/>
+          </p:cNvSpPr>
+          <p:nvPr>
+            <p:ph type="sldImg"/>
+          </p:nvPr>
+        </p:nvSpPr>
+        <p:spPr>
+          <a:xfrm>
+            <a:off x="685800" y="1143000"/>
+            <a:ext cx="5486400" cy="3086100"/>
+          </a:xfrm>
+        </p:spPr>
+      </p:sp>
+      <p:sp>
+        <p:nvSpPr>
+          <p:cNvPr id="3" name="Notes Placeholder 2"/>
+          <p:cNvSpPr>
+            <a:spLocks noGrp="1"/>
+          </p:cNvSpPr>
+          <p:nvPr>
+            <p:ph type="body" idx="1"/>
+          </p:nvPr>
+        </p:nvSpPr>
+        <p:spPr/>
+        <p:txBody>
+          <a:bodyPr>
+            <a:normAutofit fontScale="87500"/>
+          </a:bodyPr>
+          <a:lstStyle/>
+          <a:p>
+            <a:pPr>
+              <a:spcBef>
+                <a:spcPct val="43750"/>
+              </a:spcBef>
+              <a:spcAft>
+                <a:spcPct val="43750"/>
+              </a:spcAft>
+            </a:pPr>
+            <a:r>
+              <a:t>In this Learn Module, we have covered all the basics of Natural Language Processing such as: text representation, traditional recurrent network models, and near state-of-the-art models with attention. We were focusing mostly on text classification and did not discuss in detail other important tasks like named entity recognition, machine translation and question answering. To implement those tasks, the same basic RNN principles are used with a different top layer architecture. To get a more complete understanding of the NLP field, you should experiment with some of those problems as well.</a:t>
+            </a:r>
+          </a:p>
+          <a:p>
+            <a:endParaRPr/>
+          </a:p>
+          <a:p>
+            <a:pPr>
+              <a:spcBef>
+                <a:spcPct val="43750"/>
+              </a:spcBef>
+              <a:spcAft>
+                <a:spcPct val="43750"/>
+              </a:spcAft>
+            </a:pPr>
+            <a:r>
+              <a:t>One of the other emerging areas of NLP is model visualization and probing. This direction is also known as </a:t>
+            </a:r>
+            <a:r>
+              <a:rPr>
+                <a:hlinkClick r:id="rId3"/>
+              </a:rPr>
+              <a:t>BERTology</a:t>
+            </a:r>
+            <a:r>
+              <a:t>. As we have seen in the previous unit, visualizing attention matrix can tell us a lot about how machine translation works and where the model "looks" when translating a word. There are other powerful methods of understanding BERT internals.</a:t>
+            </a:r>
+          </a:p>
+          <a:p>
+            <a:endParaRPr/>
+          </a:p>
+          <a:p>
+            <a:pPr>
+              <a:spcBef>
+                <a:spcPct val="43750"/>
+              </a:spcBef>
+              <a:spcAft>
+                <a:spcPct val="43750"/>
+              </a:spcAft>
+            </a:pPr>
+            <a:r>
+              <a:t>The latest text generative models, such as GPT-2/3, are slightly different from BERT, in a sense that they can be "programmed" to solve different tasks just by providing an "initial sequence" for text generation. This could lead to a possible paradigm shift where instead of doing transfer learning training we would be focusing on creating suitable questions for giant pre-trained networks. If you want to get really serious about NLP, you probably need to explore some of the latest text generative models, such as </a:t>
+            </a:r>
+            <a:r>
+              <a:rPr>
+                <a:hlinkClick r:id="rId4"/>
+              </a:rPr>
+              <a:t>GPT-2</a:t>
+            </a:r>
+            <a:r>
+              <a:t>, or </a:t>
+            </a:r>
+            <a:r>
+              <a:rPr>
+                <a:hlinkClick r:id="rId5"/>
+              </a:rPr>
+              <a:t>Microsoft Turing NLG</a:t>
+            </a:r>
+            <a:r>
+              <a:t>.</a:t>
+            </a:r>
+          </a:p>
+          <a:p>
+            <a:endParaRPr/>
+          </a:p>
+          <a:p>
+            <a:pPr>
+              <a:spcBef>
+                <a:spcPct val="43750"/>
+              </a:spcBef>
+              <a:spcAft>
+                <a:spcPct val="43750"/>
+              </a:spcAft>
+            </a:pPr>
+            <a:r>
+              <a:t>Now you have the basics to get started on any natural language task!</a:t>
+            </a:r>
+          </a:p>
+        </p:txBody>
+      </p:sp>
+      <p:sp>
+        <p:nvSpPr>
+          <p:cNvPr id="4" name="Slide Number Placeholder 3"/>
+          <p:cNvSpPr>
+            <a:spLocks noGrp="1"/>
+          </p:cNvSpPr>
+          <p:nvPr>
+            <p:ph type="sldNum" sz="quarter" idx="10"/>
+          </p:nvPr>
+        </p:nvSpPr>
+        <p:spPr/>
+        <p:txBody>
+          <a:bodyPr/>
+          <a:lstStyle/>
+          <a:p>
+            <a:fld id="{6101C5E1-D8E9-464D-A93E-CE21651935A7}" type="slidenum">
+              <a:rPr lang="en-US" smtClean="0"/>
+              <a:t>24</a:t>
+            </a:fld>
+            <a:endParaRPr lang="en-US"/>
+          </a:p>
+        </p:txBody>
+      </p:sp>
+    </p:spTree>
+  </p:cSld>
+  <p:clrMapOvr>
+    <a:masterClrMapping/>
+  </p:clrMapOvr>
+</p:notes>
+</file>
+
 <file path=ppt/notesSlides/notesSlide3.xml><?xml version="1.0" encoding="utf-8"?>
 <p:notes xmlns:a="http://schemas.openxmlformats.org/drawingml/2006/main" xmlns:r="http://schemas.openxmlformats.org/officeDocument/2006/relationships" xmlns:p="http://schemas.openxmlformats.org/presentationml/2006/main">
   <p:cSld>
@@ -1332,7 +2172,7 @@
           <a:p>
             <a:fld id="{6101C5E1-D8E9-464D-A93E-CE21651935A7}" type="slidenum">
               <a:rPr lang="en-US" smtClean="0"/>
-              <a:t>7</a:t>
+              <a:t>6</a:t>
             </a:fld>
             <a:endParaRPr lang="en-US"/>
           </a:p>
@@ -1451,7 +2291,7 @@
           <a:p>
             <a:fld id="{6101C5E1-D8E9-464D-A93E-CE21651935A7}" type="slidenum">
               <a:rPr lang="en-US" smtClean="0"/>
-              <a:t>8</a:t>
+              <a:t>7</a:t>
             </a:fld>
             <a:endParaRPr lang="en-US"/>
           </a:p>
@@ -1512,7 +2352,7 @@
         <p:spPr/>
         <p:txBody>
           <a:bodyPr>
-            <a:normAutofit fontScale="70000"/>
+            <a:normAutofit fontScale="77500" lnSpcReduction="10000"/>
           </a:bodyPr>
           <a:lstStyle/>
           <a:p>
@@ -1678,7 +2518,7 @@
           <a:p>
             <a:fld id="{6101C5E1-D8E9-464D-A93E-CE21651935A7}" type="slidenum">
               <a:rPr lang="en-US" smtClean="0"/>
-              <a:t>9</a:t>
+              <a:t>8</a:t>
             </a:fld>
             <a:endParaRPr lang="en-US"/>
           </a:p>
@@ -1764,7 +2604,7 @@
           <a:p>
             <a:fld id="{6101C5E1-D8E9-464D-A93E-CE21651935A7}" type="slidenum">
               <a:rPr lang="en-US" smtClean="0"/>
-              <a:t>10</a:t>
+              <a:t>9</a:t>
             </a:fld>
             <a:endParaRPr lang="en-US"/>
           </a:p>
@@ -1852,7 +2692,7 @@
           <a:p>
             <a:fld id="{6101C5E1-D8E9-464D-A93E-CE21651935A7}" type="slidenum">
               <a:rPr lang="en-US" smtClean="0"/>
-              <a:t>11</a:t>
+              <a:t>10</a:t>
             </a:fld>
             <a:endParaRPr lang="en-US"/>
           </a:p>
@@ -2035,7 +2875,7 @@
           <a:p>
             <a:fld id="{6BCEF5B5-AC0E-4F39-83CD-CBF2ADC9D2D6}" type="datetimeFigureOut">
               <a:rPr lang="en-US" smtClean="0"/>
-              <a:t>2/3/2022</a:t>
+              <a:t>2/4/22</a:t>
             </a:fld>
             <a:endParaRPr lang="en-US"/>
           </a:p>
@@ -2198,7 +3038,7 @@
           <a:p>
             <a:fld id="{5E79D241-3E94-4FD8-ACD8-E66952034A0D}" type="datetimeFigureOut">
               <a:rPr lang="en-US" smtClean="0"/>
-              <a:t>2/3/2022</a:t>
+              <a:t>2/4/22</a:t>
             </a:fld>
             <a:endParaRPr lang="en-US"/>
           </a:p>
@@ -2914,7 +3754,7 @@
         <p:fade/>
       </p:transition>
     </mc:Choice>
-    <mc:Fallback xmlns:p159="http://schemas.microsoft.com/office/powerpoint/2015/09/main" xmlns:p15="http://schemas.microsoft.com/office/powerpoint/2012/main" xmlns:a14="http://schemas.microsoft.com/office/drawing/2010/main" xmlns:wp="http://schemas.openxmlformats.org/drawingml/2006/wordprocessingDrawing" xmlns:w="http://schemas.openxmlformats.org/wordprocessingml/2006/main" xmlns:m="http://schemas.openxmlformats.org/officeDocument/2006/math" xmlns="">
+    <mc:Fallback xmlns="" xmlns:m="http://schemas.openxmlformats.org/officeDocument/2006/math" xmlns:w="http://schemas.openxmlformats.org/wordprocessingml/2006/main" xmlns:wp="http://schemas.openxmlformats.org/drawingml/2006/wordprocessingDrawing" xmlns:a14="http://schemas.microsoft.com/office/drawing/2010/main" xmlns:p15="http://schemas.microsoft.com/office/powerpoint/2012/main" xmlns:p159="http://schemas.microsoft.com/office/powerpoint/2015/09/main">
       <p:transition spd="med">
         <p:fade/>
       </p:transition>
@@ -3156,7 +3996,7 @@
         <p:fade/>
       </p:transition>
     </mc:Choice>
-    <mc:Fallback xmlns:p159="http://schemas.microsoft.com/office/powerpoint/2015/09/main" xmlns:p15="http://schemas.microsoft.com/office/powerpoint/2012/main" xmlns:a14="http://schemas.microsoft.com/office/drawing/2010/main" xmlns:wp="http://schemas.openxmlformats.org/drawingml/2006/wordprocessingDrawing" xmlns:w="http://schemas.openxmlformats.org/wordprocessingml/2006/main" xmlns:m="http://schemas.openxmlformats.org/officeDocument/2006/math" xmlns="">
+    <mc:Fallback xmlns="" xmlns:m="http://schemas.openxmlformats.org/officeDocument/2006/math" xmlns:w="http://schemas.openxmlformats.org/wordprocessingml/2006/main" xmlns:wp="http://schemas.openxmlformats.org/drawingml/2006/wordprocessingDrawing" xmlns:a14="http://schemas.microsoft.com/office/drawing/2010/main" xmlns:p15="http://schemas.microsoft.com/office/powerpoint/2012/main" xmlns:p159="http://schemas.microsoft.com/office/powerpoint/2015/09/main">
       <p:transition spd="med">
         <p:fade/>
       </p:transition>
@@ -5092,7 +5932,7 @@
           <a:p>
             <a:fld id="{F370170F-9454-4FE8-996A-361D13F09AF8}" type="datetimeFigureOut">
               <a:rPr lang="en-US" smtClean="0"/>
-              <a:t>2/3/2022</a:t>
+              <a:t>2/4/22</a:t>
             </a:fld>
             <a:endParaRPr lang="en-US"/>
           </a:p>
@@ -8174,7 +9014,7 @@
         <p:fade/>
       </p:transition>
     </mc:Choice>
-    <mc:Fallback xmlns:p159="http://schemas.microsoft.com/office/powerpoint/2015/09/main" xmlns:p15="http://schemas.microsoft.com/office/powerpoint/2012/main" xmlns:a14="http://schemas.microsoft.com/office/drawing/2010/main" xmlns:wp="http://schemas.openxmlformats.org/drawingml/2006/wordprocessingDrawing" xmlns:w="http://schemas.openxmlformats.org/wordprocessingml/2006/main" xmlns:m="http://schemas.openxmlformats.org/officeDocument/2006/math" xmlns="">
+    <mc:Fallback xmlns="" xmlns:m="http://schemas.openxmlformats.org/officeDocument/2006/math" xmlns:w="http://schemas.openxmlformats.org/wordprocessingml/2006/main" xmlns:wp="http://schemas.openxmlformats.org/drawingml/2006/wordprocessingDrawing" xmlns:a14="http://schemas.microsoft.com/office/drawing/2010/main" xmlns:p15="http://schemas.microsoft.com/office/powerpoint/2012/main" xmlns:p159="http://schemas.microsoft.com/office/powerpoint/2015/09/main">
       <p:transition spd="med">
         <p:fade/>
       </p:transition>
@@ -12197,7 +13037,7 @@
         <p:fade/>
       </p:transition>
     </mc:Choice>
-    <mc:Fallback xmlns:p159="http://schemas.microsoft.com/office/powerpoint/2015/09/main" xmlns:p15="http://schemas.microsoft.com/office/powerpoint/2012/main" xmlns:a14="http://schemas.microsoft.com/office/drawing/2010/main" xmlns:wp="http://schemas.openxmlformats.org/drawingml/2006/wordprocessingDrawing" xmlns:w="http://schemas.openxmlformats.org/wordprocessingml/2006/main" xmlns:m="http://schemas.openxmlformats.org/officeDocument/2006/math" xmlns="">
+    <mc:Fallback xmlns="" xmlns:m="http://schemas.openxmlformats.org/officeDocument/2006/math" xmlns:w="http://schemas.openxmlformats.org/wordprocessingml/2006/main" xmlns:wp="http://schemas.openxmlformats.org/drawingml/2006/wordprocessingDrawing" xmlns:a14="http://schemas.microsoft.com/office/drawing/2010/main" xmlns:p15="http://schemas.microsoft.com/office/powerpoint/2012/main" xmlns:p159="http://schemas.microsoft.com/office/powerpoint/2015/09/main">
       <p:transition spd="med">
         <p:fade/>
       </p:transition>
@@ -15035,7 +15875,7 @@
         <p:fade/>
       </p:transition>
     </mc:Choice>
-    <mc:Fallback xmlns:p159="http://schemas.microsoft.com/office/powerpoint/2015/09/main" xmlns:p15="http://schemas.microsoft.com/office/powerpoint/2012/main" xmlns:a14="http://schemas.microsoft.com/office/drawing/2010/main" xmlns:wp="http://schemas.openxmlformats.org/drawingml/2006/wordprocessingDrawing" xmlns:w="http://schemas.openxmlformats.org/wordprocessingml/2006/main" xmlns:m="http://schemas.openxmlformats.org/officeDocument/2006/math" xmlns="">
+    <mc:Fallback xmlns="" xmlns:m="http://schemas.openxmlformats.org/officeDocument/2006/math" xmlns:w="http://schemas.openxmlformats.org/wordprocessingml/2006/main" xmlns:wp="http://schemas.openxmlformats.org/drawingml/2006/wordprocessingDrawing" xmlns:a14="http://schemas.microsoft.com/office/drawing/2010/main" xmlns:p15="http://schemas.microsoft.com/office/powerpoint/2012/main" xmlns:p159="http://schemas.microsoft.com/office/powerpoint/2015/09/main">
       <p:transition spd="med">
         <p:fade/>
       </p:transition>
@@ -15226,7 +16066,7 @@
         <p:fade/>
       </p:transition>
     </mc:Choice>
-    <mc:Fallback xmlns:p159="http://schemas.microsoft.com/office/powerpoint/2015/09/main" xmlns:p15="http://schemas.microsoft.com/office/powerpoint/2012/main" xmlns:a14="http://schemas.microsoft.com/office/drawing/2010/main" xmlns:wp="http://schemas.openxmlformats.org/drawingml/2006/wordprocessingDrawing" xmlns:w="http://schemas.openxmlformats.org/wordprocessingml/2006/main" xmlns:m="http://schemas.openxmlformats.org/officeDocument/2006/math" xmlns="">
+    <mc:Fallback xmlns="" xmlns:m="http://schemas.openxmlformats.org/officeDocument/2006/math" xmlns:w="http://schemas.openxmlformats.org/wordprocessingml/2006/main" xmlns:wp="http://schemas.openxmlformats.org/drawingml/2006/wordprocessingDrawing" xmlns:a14="http://schemas.microsoft.com/office/drawing/2010/main" xmlns:p15="http://schemas.microsoft.com/office/powerpoint/2012/main" xmlns:p159="http://schemas.microsoft.com/office/powerpoint/2015/09/main">
       <p:transition spd="med">
         <p:fade/>
       </p:transition>
@@ -15341,7 +16181,7 @@
         <p:fade/>
       </p:transition>
     </mc:Choice>
-    <mc:Fallback xmlns:p159="http://schemas.microsoft.com/office/powerpoint/2015/09/main" xmlns:p15="http://schemas.microsoft.com/office/powerpoint/2012/main" xmlns:a14="http://schemas.microsoft.com/office/drawing/2010/main" xmlns:wp="http://schemas.openxmlformats.org/drawingml/2006/wordprocessingDrawing" xmlns:w="http://schemas.openxmlformats.org/wordprocessingml/2006/main" xmlns:m="http://schemas.openxmlformats.org/officeDocument/2006/math" xmlns="">
+    <mc:Fallback xmlns="" xmlns:m="http://schemas.openxmlformats.org/officeDocument/2006/math" xmlns:w="http://schemas.openxmlformats.org/wordprocessingml/2006/main" xmlns:wp="http://schemas.openxmlformats.org/drawingml/2006/wordprocessingDrawing" xmlns:a14="http://schemas.microsoft.com/office/drawing/2010/main" xmlns:p15="http://schemas.microsoft.com/office/powerpoint/2012/main" xmlns:p159="http://schemas.microsoft.com/office/powerpoint/2015/09/main">
       <p:transition spd="med">
         <p:fade/>
       </p:transition>
@@ -16986,7 +17826,7 @@
         <p:fade/>
       </p:transition>
     </mc:Choice>
-    <mc:Fallback xmlns:p159="http://schemas.microsoft.com/office/powerpoint/2015/09/main" xmlns:p15="http://schemas.microsoft.com/office/powerpoint/2012/main" xmlns:a14="http://schemas.microsoft.com/office/drawing/2010/main" xmlns:wp="http://schemas.openxmlformats.org/drawingml/2006/wordprocessingDrawing" xmlns:w="http://schemas.openxmlformats.org/wordprocessingml/2006/main" xmlns:m="http://schemas.openxmlformats.org/officeDocument/2006/math" xmlns="">
+    <mc:Fallback xmlns="" xmlns:m="http://schemas.openxmlformats.org/officeDocument/2006/math" xmlns:w="http://schemas.openxmlformats.org/wordprocessingml/2006/main" xmlns:wp="http://schemas.openxmlformats.org/drawingml/2006/wordprocessingDrawing" xmlns:a14="http://schemas.microsoft.com/office/drawing/2010/main" xmlns:p15="http://schemas.microsoft.com/office/powerpoint/2012/main" xmlns:p159="http://schemas.microsoft.com/office/powerpoint/2015/09/main">
       <p:transition spd="med">
         <p:fade/>
       </p:transition>
@@ -17204,7 +18044,7 @@
         <p:fade/>
       </p:transition>
     </mc:Choice>
-    <mc:Fallback xmlns:p159="http://schemas.microsoft.com/office/powerpoint/2015/09/main" xmlns:p15="http://schemas.microsoft.com/office/powerpoint/2012/main" xmlns:a14="http://schemas.microsoft.com/office/drawing/2010/main" xmlns:wp="http://schemas.openxmlformats.org/drawingml/2006/wordprocessingDrawing" xmlns:w="http://schemas.openxmlformats.org/wordprocessingml/2006/main" xmlns:m="http://schemas.openxmlformats.org/officeDocument/2006/math" xmlns="">
+    <mc:Fallback xmlns="" xmlns:m="http://schemas.openxmlformats.org/officeDocument/2006/math" xmlns:w="http://schemas.openxmlformats.org/wordprocessingml/2006/main" xmlns:wp="http://schemas.openxmlformats.org/drawingml/2006/wordprocessingDrawing" xmlns:a14="http://schemas.microsoft.com/office/drawing/2010/main" xmlns:p15="http://schemas.microsoft.com/office/powerpoint/2012/main" xmlns:p159="http://schemas.microsoft.com/office/powerpoint/2015/09/main">
       <p:transition spd="med">
         <p:fade/>
       </p:transition>
@@ -18035,7 +18875,7 @@
           <a:p>
             <a:fld id="{6F757F23-1060-4B99-A242-7F37FF0FF3B8}" type="datetimeFigureOut">
               <a:rPr lang="en-US" smtClean="0"/>
-              <a:t>2/3/2022</a:t>
+              <a:t>2/4/22</a:t>
             </a:fld>
             <a:endParaRPr lang="en-US"/>
           </a:p>
@@ -21288,7 +22128,7 @@
           <a:p>
             <a:fld id="{6F0525F4-D581-4FE7-B636-68AFE22F88EF}" type="datetimeFigureOut">
               <a:rPr lang="en-US" smtClean="0"/>
-              <a:t>2/3/2022</a:t>
+              <a:t>2/4/22</a:t>
             </a:fld>
             <a:endParaRPr lang="en-US"/>
           </a:p>
@@ -23894,7 +24734,7 @@
           <a:p>
             <a:fld id="{FF8C8D49-A8FC-4C42-B0CE-B16B2D62B89D}" type="datetimeFigureOut">
               <a:rPr lang="en-US" smtClean="0"/>
-              <a:t>2/3/2022</a:t>
+              <a:t>2/4/22</a:t>
             </a:fld>
             <a:endParaRPr lang="en-US"/>
           </a:p>
@@ -28484,7 +29324,7 @@
           <a:p>
             <a:fld id="{06D2CB24-93FB-43EA-B5BB-2216D2270DE5}" type="datetimeFigureOut">
               <a:rPr lang="en-US" smtClean="0"/>
-              <a:t>2/3/2022</a:t>
+              <a:t>2/4/22</a:t>
             </a:fld>
             <a:endParaRPr lang="en-US"/>
           </a:p>
@@ -30091,7 +30931,7 @@
         <p:fade/>
       </p:transition>
     </mc:Choice>
-    <mc:Fallback xmlns:p159="http://schemas.microsoft.com/office/powerpoint/2015/09/main" xmlns:p15="http://schemas.microsoft.com/office/powerpoint/2012/main" xmlns:a14="http://schemas.microsoft.com/office/drawing/2010/main" xmlns:wp="http://schemas.openxmlformats.org/drawingml/2006/wordprocessingDrawing" xmlns:w="http://schemas.openxmlformats.org/wordprocessingml/2006/main" xmlns:m="http://schemas.openxmlformats.org/officeDocument/2006/math" xmlns="">
+    <mc:Fallback xmlns="" xmlns:m="http://schemas.openxmlformats.org/officeDocument/2006/math" xmlns:w="http://schemas.openxmlformats.org/wordprocessingml/2006/main" xmlns:wp="http://schemas.openxmlformats.org/drawingml/2006/wordprocessingDrawing" xmlns:a14="http://schemas.microsoft.com/office/drawing/2010/main" xmlns:p15="http://schemas.microsoft.com/office/powerpoint/2012/main" xmlns:p159="http://schemas.microsoft.com/office/powerpoint/2015/09/main">
       <p:transition spd="med">
         <p:fade/>
       </p:transition>
@@ -30285,7 +31125,7 @@
         <p:fade/>
       </p:transition>
     </mc:Choice>
-    <mc:Fallback xmlns:p159="http://schemas.microsoft.com/office/powerpoint/2015/09/main" xmlns:p15="http://schemas.microsoft.com/office/powerpoint/2012/main" xmlns:a14="http://schemas.microsoft.com/office/drawing/2010/main" xmlns:wp="http://schemas.openxmlformats.org/drawingml/2006/wordprocessingDrawing" xmlns:w="http://schemas.openxmlformats.org/wordprocessingml/2006/main" xmlns:m="http://schemas.openxmlformats.org/officeDocument/2006/math" xmlns="">
+    <mc:Fallback xmlns="" xmlns:m="http://schemas.openxmlformats.org/officeDocument/2006/math" xmlns:w="http://schemas.openxmlformats.org/wordprocessingml/2006/main" xmlns:wp="http://schemas.openxmlformats.org/drawingml/2006/wordprocessingDrawing" xmlns:a14="http://schemas.microsoft.com/office/drawing/2010/main" xmlns:p15="http://schemas.microsoft.com/office/powerpoint/2012/main" xmlns:p159="http://schemas.microsoft.com/office/powerpoint/2015/09/main">
       <p:transition spd="med">
         <p:fade/>
       </p:transition>
@@ -30405,7 +31245,7 @@
         <p:fade/>
       </p:transition>
     </mc:Choice>
-    <mc:Fallback xmlns:p159="http://schemas.microsoft.com/office/powerpoint/2015/09/main" xmlns:p15="http://schemas.microsoft.com/office/powerpoint/2012/main" xmlns:a14="http://schemas.microsoft.com/office/drawing/2010/main" xmlns:wp="http://schemas.openxmlformats.org/drawingml/2006/wordprocessingDrawing" xmlns:w="http://schemas.openxmlformats.org/wordprocessingml/2006/main" xmlns:m="http://schemas.openxmlformats.org/officeDocument/2006/math" xmlns="">
+    <mc:Fallback xmlns="" xmlns:m="http://schemas.openxmlformats.org/officeDocument/2006/math" xmlns:w="http://schemas.openxmlformats.org/wordprocessingml/2006/main" xmlns:wp="http://schemas.openxmlformats.org/drawingml/2006/wordprocessingDrawing" xmlns:a14="http://schemas.microsoft.com/office/drawing/2010/main" xmlns:p15="http://schemas.microsoft.com/office/powerpoint/2012/main" xmlns:p159="http://schemas.microsoft.com/office/powerpoint/2015/09/main">
       <p:transition spd="med">
         <p:fade/>
       </p:transition>
@@ -31173,7 +32013,7 @@
           <a:p>
             <a:fld id="{A5DD7F6D-6289-47A1-B52A-22CF6052E5AB}" type="datetimeFigureOut">
               <a:rPr lang="en-US" smtClean="0"/>
-              <a:t>2/3/2022</a:t>
+              <a:t>2/4/22</a:t>
             </a:fld>
             <a:endParaRPr lang="en-US"/>
           </a:p>
@@ -31537,7 +32377,7 @@
         <p:fade/>
       </p:transition>
     </mc:Choice>
-    <mc:Fallback xmlns:p159="http://schemas.microsoft.com/office/powerpoint/2015/09/main" xmlns:p15="http://schemas.microsoft.com/office/powerpoint/2012/main" xmlns:a14="http://schemas.microsoft.com/office/drawing/2010/main" xmlns:wp="http://schemas.openxmlformats.org/drawingml/2006/wordprocessingDrawing" xmlns:w="http://schemas.openxmlformats.org/wordprocessingml/2006/main" xmlns:m="http://schemas.openxmlformats.org/officeDocument/2006/math" xmlns="">
+    <mc:Fallback xmlns="" xmlns:m="http://schemas.openxmlformats.org/officeDocument/2006/math" xmlns:w="http://schemas.openxmlformats.org/wordprocessingml/2006/main" xmlns:wp="http://schemas.openxmlformats.org/drawingml/2006/wordprocessingDrawing" xmlns:a14="http://schemas.microsoft.com/office/drawing/2010/main" xmlns:p15="http://schemas.microsoft.com/office/powerpoint/2012/main" xmlns:p159="http://schemas.microsoft.com/office/powerpoint/2015/09/main">
       <p:transition spd="med">
         <p:fade/>
       </p:transition>
@@ -31779,7 +32619,7 @@
         <p:fade/>
       </p:transition>
     </mc:Choice>
-    <mc:Fallback xmlns:p159="http://schemas.microsoft.com/office/powerpoint/2015/09/main" xmlns:p15="http://schemas.microsoft.com/office/powerpoint/2012/main" xmlns:a14="http://schemas.microsoft.com/office/drawing/2010/main" xmlns:wp="http://schemas.openxmlformats.org/drawingml/2006/wordprocessingDrawing" xmlns:w="http://schemas.openxmlformats.org/wordprocessingml/2006/main" xmlns:m="http://schemas.openxmlformats.org/officeDocument/2006/math" xmlns="">
+    <mc:Fallback xmlns="" xmlns:m="http://schemas.openxmlformats.org/officeDocument/2006/math" xmlns:w="http://schemas.openxmlformats.org/wordprocessingml/2006/main" xmlns:wp="http://schemas.openxmlformats.org/drawingml/2006/wordprocessingDrawing" xmlns:a14="http://schemas.microsoft.com/office/drawing/2010/main" xmlns:p15="http://schemas.microsoft.com/office/powerpoint/2012/main" xmlns:p159="http://schemas.microsoft.com/office/powerpoint/2015/09/main">
       <p:transition spd="med">
         <p:fade/>
       </p:transition>
@@ -34462,7 +35302,7 @@
           <a:p>
             <a:fld id="{A78FB906-3FFF-471F-94AF-5456206C08D2}" type="datetimeFigureOut">
               <a:rPr lang="en-US" smtClean="0"/>
-              <a:t>2/3/2022</a:t>
+              <a:t>2/4/22</a:t>
             </a:fld>
             <a:endParaRPr lang="en-US"/>
           </a:p>
@@ -37065,7 +37905,7 @@
           <a:p>
             <a:fld id="{B186545D-18D2-4F8A-AED4-A9F72700D396}" type="datetimeFigureOut">
               <a:rPr lang="en-US" smtClean="0"/>
-              <a:t>2/3/2022</a:t>
+              <a:t>2/4/22</a:t>
             </a:fld>
             <a:endParaRPr lang="en-US"/>
           </a:p>
@@ -41148,7 +41988,7 @@
           <a:p>
             <a:fld id="{A5EBAA1A-6AC4-4030-AC95-8FA79DFD7B37}" type="datetimeFigureOut">
               <a:rPr lang="en-US" smtClean="0"/>
-              <a:t>2/3/2022</a:t>
+              <a:t>2/4/22</a:t>
             </a:fld>
             <a:endParaRPr lang="en-US"/>
           </a:p>
@@ -43488,7 +44328,7 @@
         <p:fade/>
       </p:transition>
     </mc:Choice>
-    <mc:Fallback xmlns:p159="http://schemas.microsoft.com/office/powerpoint/2015/09/main" xmlns:p15="http://schemas.microsoft.com/office/powerpoint/2012/main" xmlns:a14="http://schemas.microsoft.com/office/drawing/2010/main" xmlns:wp="http://schemas.openxmlformats.org/drawingml/2006/wordprocessingDrawing" xmlns:w="http://schemas.openxmlformats.org/wordprocessingml/2006/main" xmlns:m="http://schemas.openxmlformats.org/officeDocument/2006/math" xmlns="">
+    <mc:Fallback xmlns="" xmlns:m="http://schemas.openxmlformats.org/officeDocument/2006/math" xmlns:w="http://schemas.openxmlformats.org/wordprocessingml/2006/main" xmlns:wp="http://schemas.openxmlformats.org/drawingml/2006/wordprocessingDrawing" xmlns:a14="http://schemas.microsoft.com/office/drawing/2010/main" xmlns:p15="http://schemas.microsoft.com/office/powerpoint/2012/main" xmlns:p159="http://schemas.microsoft.com/office/powerpoint/2015/09/main">
       <p:transition spd="med">
         <p:fade/>
       </p:transition>
@@ -43679,7 +44519,7 @@
         <p:fade/>
       </p:transition>
     </mc:Choice>
-    <mc:Fallback xmlns:p159="http://schemas.microsoft.com/office/powerpoint/2015/09/main" xmlns:p15="http://schemas.microsoft.com/office/powerpoint/2012/main" xmlns:a14="http://schemas.microsoft.com/office/drawing/2010/main" xmlns:wp="http://schemas.openxmlformats.org/drawingml/2006/wordprocessingDrawing" xmlns:w="http://schemas.openxmlformats.org/wordprocessingml/2006/main" xmlns:m="http://schemas.openxmlformats.org/officeDocument/2006/math" xmlns="">
+    <mc:Fallback xmlns="" xmlns:m="http://schemas.openxmlformats.org/officeDocument/2006/math" xmlns:w="http://schemas.openxmlformats.org/wordprocessingml/2006/main" xmlns:wp="http://schemas.openxmlformats.org/drawingml/2006/wordprocessingDrawing" xmlns:a14="http://schemas.microsoft.com/office/drawing/2010/main" xmlns:p15="http://schemas.microsoft.com/office/powerpoint/2012/main" xmlns:p159="http://schemas.microsoft.com/office/powerpoint/2015/09/main">
       <p:transition spd="med">
         <p:fade/>
       </p:transition>
@@ -43794,7 +44634,7 @@
         <p:fade/>
       </p:transition>
     </mc:Choice>
-    <mc:Fallback xmlns:p159="http://schemas.microsoft.com/office/powerpoint/2015/09/main" xmlns:p15="http://schemas.microsoft.com/office/powerpoint/2012/main" xmlns:a14="http://schemas.microsoft.com/office/drawing/2010/main" xmlns:wp="http://schemas.openxmlformats.org/drawingml/2006/wordprocessingDrawing" xmlns:w="http://schemas.openxmlformats.org/wordprocessingml/2006/main" xmlns:m="http://schemas.openxmlformats.org/officeDocument/2006/math" xmlns="">
+    <mc:Fallback xmlns="" xmlns:m="http://schemas.openxmlformats.org/officeDocument/2006/math" xmlns:w="http://schemas.openxmlformats.org/wordprocessingml/2006/main" xmlns:wp="http://schemas.openxmlformats.org/drawingml/2006/wordprocessingDrawing" xmlns:a14="http://schemas.microsoft.com/office/drawing/2010/main" xmlns:p15="http://schemas.microsoft.com/office/powerpoint/2012/main" xmlns:p159="http://schemas.microsoft.com/office/powerpoint/2015/09/main">
       <p:transition spd="med">
         <p:fade/>
       </p:transition>
@@ -44306,7 +45146,7 @@
           <a:p>
             <a:fld id="{E8FD0B7A-F5DD-4F40-B4CB-3B2C354B893A}" type="datetimeFigureOut">
               <a:rPr lang="en-US" smtClean="0"/>
-              <a:t>2/3/2022</a:t>
+              <a:t>2/4/22</a:t>
             </a:fld>
             <a:endParaRPr lang="en-US"/>
           </a:p>
@@ -52814,6 +53654,36 @@
           </a:p>
         </p:txBody>
       </p:sp>
+      <p:pic>
+        <p:nvPicPr>
+          <p:cNvPr id="5" name="Picture 4">
+            <a:extLst>
+              <a:ext uri="{FF2B5EF4-FFF2-40B4-BE49-F238E27FC236}">
+                <a16:creationId xmlns:a16="http://schemas.microsoft.com/office/drawing/2014/main" id="{63821015-3DA8-A544-8B46-F83920345775}"/>
+              </a:ext>
+            </a:extLst>
+          </p:cNvPr>
+          <p:cNvPicPr>
+            <a:picLocks noChangeAspect="1"/>
+          </p:cNvPicPr>
+          <p:nvPr/>
+        </p:nvPicPr>
+        <p:blipFill>
+          <a:blip r:embed="rId3"/>
+          <a:stretch>
+            <a:fillRect/>
+          </a:stretch>
+        </p:blipFill>
+        <p:spPr>
+          <a:xfrm>
+            <a:off x="0" y="0"/>
+            <a:ext cx="12192000" cy="6858000"/>
+          </a:xfrm>
+          <a:prstGeom prst="rect">
+            <a:avLst/>
+          </a:prstGeom>
+        </p:spPr>
+      </p:pic>
     </p:spTree>
   </p:cSld>
   <p:clrMapOvr>
@@ -52847,41 +53717,197 @@
             <a:spLocks noGrp="1"/>
           </p:cNvSpPr>
           <p:nvPr>
-            <p:ph type="title" hasCustomPrompt="1"/>
+            <p:ph type="title"/>
           </p:nvPr>
         </p:nvSpPr>
-        <p:spPr/>
-        <p:txBody>
-          <a:bodyPr wrap="square" lIns="0" tIns="0" rIns="0" bIns="0" anchor="b" anchorCtr="0">
-            <a:spAutoFit/>
-          </a:bodyPr>
+        <p:spPr>
+          <a:xfrm>
+            <a:off x="588263" y="457200"/>
+            <a:ext cx="11018520" cy="548640"/>
+          </a:xfrm>
+        </p:spPr>
+        <p:txBody>
+          <a:bodyPr/>
           <a:lstStyle>
-            <a:lvl1pPr algn="l" defTabSz="932742" rtl="0" eaLnBrk="1" latinLnBrk="0" hangingPunct="1">
-              <a:lnSpc>
-                <a:spcPct val="90000"/>
-              </a:lnSpc>
-              <a:spcBef>
-                <a:spcPct val="0"/>
-              </a:spcBef>
-              <a:buNone/>
-              <a:defRPr lang="en-US" sz="3600" b="0" kern="1200" cap="none" spc="-50" baseline="0">
-                <a:ln w="3175">
-                  <a:noFill/>
-                </a:ln>
+            <a:lvl1pPr>
+              <a:defRPr>
                 <a:solidFill>
                   <a:schemeClr val="tx1"/>
                 </a:solidFill>
-                <a:effectLst/>
-                <a:latin typeface="+mj-lt"/>
-                <a:ea typeface="+mn-ea"/>
-                <a:cs typeface="Segoe UI" pitchFamily="34" charset="0"/>
               </a:defRPr>
             </a:lvl1pPr>
           </a:lstStyle>
           <a:p>
             <a:r>
               <a:rPr lang="en-US"/>
-              <a:t>Summary</a:t>
+              <a:t>Question 1</a:t>
+            </a:r>
+          </a:p>
+        </p:txBody>
+      </p:sp>
+      <p:sp>
+        <p:nvSpPr>
+          <p:cNvPr id="3" name="Subtitle"/>
+          <p:cNvSpPr>
+            <a:spLocks noGrp="1"/>
+          </p:cNvSpPr>
+          <p:nvPr>
+            <p:ph sz="quarter" idx="10"/>
+          </p:nvPr>
+        </p:nvSpPr>
+        <p:spPr>
+          <a:xfrm>
+            <a:off x="584200" y="1435100"/>
+            <a:ext cx="11018838" cy="1280160"/>
+          </a:xfrm>
+        </p:spPr>
+        <p:txBody>
+          <a:bodyPr/>
+          <a:lstStyle>
+            <a:lvl1pPr marL="0" indent="0">
+              <a:buNone/>
+              <a:defRPr>
+                <a:solidFill>
+                  <a:schemeClr val="tx1"/>
+                </a:solidFill>
+              </a:defRPr>
+            </a:lvl1pPr>
+            <a:lvl2pPr>
+              <a:defRPr>
+                <a:solidFill>
+                  <a:schemeClr val="tx1"/>
+                </a:solidFill>
+              </a:defRPr>
+            </a:lvl2pPr>
+            <a:lvl3pPr>
+              <a:defRPr>
+                <a:solidFill>
+                  <a:schemeClr val="tx1"/>
+                </a:solidFill>
+              </a:defRPr>
+            </a:lvl3pPr>
+            <a:lvl4pPr>
+              <a:defRPr>
+                <a:solidFill>
+                  <a:schemeClr val="tx1"/>
+                </a:solidFill>
+              </a:defRPr>
+            </a:lvl4pPr>
+            <a:lvl5pPr>
+              <a:defRPr>
+                <a:solidFill>
+                  <a:schemeClr val="tx1"/>
+                </a:solidFill>
+              </a:defRPr>
+            </a:lvl5pPr>
+          </a:lstStyle>
+          <a:p>
+            <a:r>
+              <a:t>Suppose your text corpus contains 80000 different words. Which of the below would you complete to reduce the dimensionality of the input vector to neural classifier?</a:t>
+            </a:r>
+          </a:p>
+        </p:txBody>
+      </p:sp>
+      <p:sp>
+        <p:nvSpPr>
+          <p:cNvPr id="4" name="New shape"/>
+          <p:cNvSpPr/>
+          <p:nvPr/>
+        </p:nvSpPr>
+        <p:spPr>
+          <a:xfrm>
+            <a:off x="586581" y="3129534"/>
+            <a:ext cx="11018838" cy="3314192"/>
+          </a:xfrm>
+          <a:prstGeom prst="rect">
+            <a:avLst/>
+          </a:prstGeom>
+          <a:noFill/>
+          <a:ln>
+            <a:noFill/>
+          </a:ln>
+        </p:spPr>
+        <p:style>
+          <a:lnRef idx="2">
+            <a:schemeClr val="accent1">
+              <a:shade val="50000"/>
+            </a:schemeClr>
+          </a:lnRef>
+          <a:fillRef idx="1">
+            <a:schemeClr val="accent1"/>
+          </a:fillRef>
+          <a:effectRef idx="0">
+            <a:schemeClr val="accent1"/>
+          </a:effectRef>
+          <a:fontRef idx="minor">
+            <a:schemeClr val="lt1"/>
+          </a:fontRef>
+        </p:style>
+        <p:txBody>
+          <a:bodyPr wrap="square" rtlCol="0" anchor="t"/>
+          <a:lstStyle/>
+          <a:p>
+            <a:pPr lvl="1" indent="-457200">
+              <a:spcAft>
+                <a:spcPct val="15000"/>
+              </a:spcAft>
+              <a:buAutoNum type="alphaUcPeriod"/>
+            </a:pPr>
+            <a:r>
+              <a:rPr sz="2500">
+                <a:solidFill>
+                  <a:srgbClr val="000000"/>
+                </a:solidFill>
+              </a:rPr>
+              <a:t>Randomly select 10% of the words and ignore the rest.</a:t>
+            </a:r>
+          </a:p>
+          <a:p>
+            <a:pPr lvl="1" indent="-457200">
+              <a:spcAft>
+                <a:spcPct val="15000"/>
+              </a:spcAft>
+              <a:buAutoNum type="alphaUcPeriod"/>
+            </a:pPr>
+            <a:r>
+              <a:rPr sz="2500">
+                <a:solidFill>
+                  <a:srgbClr val="000000"/>
+                </a:solidFill>
+              </a:rPr>
+              <a:t>Use convolutional layer before fully-connected classifier layer</a:t>
+            </a:r>
+          </a:p>
+          <a:p>
+            <a:pPr lvl="1" indent="-457200">
+              <a:spcAft>
+                <a:spcPct val="15000"/>
+              </a:spcAft>
+              <a:buAutoNum type="alphaUcPeriod"/>
+            </a:pPr>
+            <a:r>
+              <a:rPr sz="2500">
+                <a:solidFill>
+                  <a:srgbClr val="000000"/>
+                </a:solidFill>
+              </a:rPr>
+              <a:t>Use embedding layer before fully-connected classifier layer</a:t>
+            </a:r>
+          </a:p>
+          <a:p>
+            <a:pPr lvl="1" indent="-457200">
+              <a:spcAft>
+                <a:spcPct val="15000"/>
+              </a:spcAft>
+              <a:buAutoNum type="alphaUcPeriod"/>
+            </a:pPr>
+            <a:r>
+              <a:rPr sz="2500">
+                <a:solidFill>
+                  <a:srgbClr val="000000"/>
+                </a:solidFill>
+              </a:rPr>
+              <a:t>Select 10% of most frequently used words and ignore the rest</a:t>
             </a:r>
           </a:p>
         </p:txBody>
@@ -52942,7 +53968,7 @@
           <a:p>
             <a:r>
               <a:rPr lang="en-US"/>
-              <a:t>Summary</a:t>
+              <a:t>Question 1</a:t>
             </a:r>
           </a:p>
         </p:txBody>
@@ -52964,9 +53990,7 @@
           </a:xfrm>
         </p:spPr>
         <p:txBody>
-          <a:bodyPr vert="horz" wrap="square" lIns="0" tIns="0" rIns="0" bIns="0" rtlCol="0" anchor="t">
-            <a:spAutoFit/>
-          </a:bodyPr>
+          <a:bodyPr/>
           <a:lstStyle>
             <a:lvl1pPr marL="0" indent="0">
               <a:buNone/>
@@ -53007,16 +54031,114 @@
           </a:lstStyle>
           <a:p>
             <a:r>
-              <a:rPr lang="en-US" dirty="0">
-                <a:cs typeface="Segoe UI"/>
+              <a:t>Suppose your text corpus contains 80000 different words. Which of the below would you complete to reduce the dimensionality of the input vector to neural classifier?</a:t>
+            </a:r>
+          </a:p>
+        </p:txBody>
+      </p:sp>
+      <p:sp>
+        <p:nvSpPr>
+          <p:cNvPr id="4" name="New shape"/>
+          <p:cNvSpPr/>
+          <p:nvPr/>
+        </p:nvSpPr>
+        <p:spPr>
+          <a:xfrm>
+            <a:off x="586581" y="3129534"/>
+            <a:ext cx="11018838" cy="3314192"/>
+          </a:xfrm>
+          <a:prstGeom prst="rect">
+            <a:avLst/>
+          </a:prstGeom>
+          <a:noFill/>
+          <a:ln>
+            <a:noFill/>
+          </a:ln>
+        </p:spPr>
+        <p:style>
+          <a:lnRef idx="2">
+            <a:schemeClr val="accent1">
+              <a:shade val="50000"/>
+            </a:schemeClr>
+          </a:lnRef>
+          <a:fillRef idx="1">
+            <a:schemeClr val="accent1"/>
+          </a:fillRef>
+          <a:effectRef idx="0">
+            <a:schemeClr val="accent1"/>
+          </a:effectRef>
+          <a:fontRef idx="minor">
+            <a:schemeClr val="lt1"/>
+          </a:fontRef>
+        </p:style>
+        <p:txBody>
+          <a:bodyPr wrap="square" rtlCol="0" anchor="t"/>
+          <a:lstStyle/>
+          <a:p>
+            <a:pPr lvl="1" indent="-457200">
+              <a:spcAft>
+                <a:spcPct val="15000"/>
+              </a:spcAft>
+              <a:buAutoNum type="alphaUcPeriod"/>
+            </a:pPr>
+            <a:r>
+              <a:rPr sz="2500">
+                <a:solidFill>
+                  <a:srgbClr val="000000"/>
+                </a:solidFill>
               </a:rPr>
-              <a:t>We</a:t>
-            </a:r>
-            <a:r>
-              <a:rPr dirty="0">
-                <a:cs typeface="Segoe UI"/>
+              <a:t>Randomly select 10% of the words and ignore the rest.</a:t>
+            </a:r>
+          </a:p>
+          <a:p>
+            <a:pPr lvl="1" indent="-457200">
+              <a:spcAft>
+                <a:spcPct val="15000"/>
+              </a:spcAft>
+              <a:buAutoNum type="alphaUcPeriod"/>
+            </a:pPr>
+            <a:r>
+              <a:rPr sz="2500">
+                <a:solidFill>
+                  <a:srgbClr val="000000"/>
+                </a:solidFill>
               </a:rPr>
-              <a:t> have covered all the basics of Natural Language Processing such as: text representation, traditional recurrent network models, and near state-of-the-art models with attention.</a:t>
+              <a:t>Use convolutional layer before fully-connected classifier layer</a:t>
+            </a:r>
+          </a:p>
+          <a:p>
+            <a:pPr lvl="1" indent="-457200">
+              <a:spcAft>
+                <a:spcPct val="15000"/>
+              </a:spcAft>
+              <a:buAutoNum type="alphaUcPeriod"/>
+            </a:pPr>
+            <a:r>
+              <a:rPr sz="2500" b="1">
+                <a:solidFill>
+                  <a:srgbClr val="000000"/>
+                </a:solidFill>
+                <a:highlight>
+                  <a:srgbClr val="F0F788"/>
+                </a:highlight>
+              </a:rPr>
+              <a:t>Use embedding layer before fully-connected classifier layer</a:t>
+            </a:r>
+          </a:p>
+          <a:p>
+            <a:pPr lvl="1" indent="-457200">
+              <a:spcAft>
+                <a:spcPct val="15000"/>
+              </a:spcAft>
+              <a:buAutoNum type="alphaUcPeriod"/>
+            </a:pPr>
+            <a:r>
+              <a:rPr sz="2500">
+                <a:solidFill>
+                  <a:srgbClr val="000000"/>
+                </a:solidFill>
+              </a:rPr>
+              <a:t>Select 10% of most frequently used words and ignore the rest</a:t>
             </a:r>
           </a:p>
         </p:txBody>
@@ -53047,6 +54169,1078 @@
           <a:chExt cx="0" cy="0"/>
         </a:xfrm>
       </p:grpSpPr>
+      <p:sp>
+        <p:nvSpPr>
+          <p:cNvPr id="2" name="Title"/>
+          <p:cNvSpPr>
+            <a:spLocks noGrp="1"/>
+          </p:cNvSpPr>
+          <p:nvPr>
+            <p:ph type="title"/>
+          </p:nvPr>
+        </p:nvSpPr>
+        <p:spPr>
+          <a:xfrm>
+            <a:off x="588263" y="457200"/>
+            <a:ext cx="11018520" cy="548640"/>
+          </a:xfrm>
+        </p:spPr>
+        <p:txBody>
+          <a:bodyPr/>
+          <a:lstStyle>
+            <a:lvl1pPr>
+              <a:defRPr>
+                <a:solidFill>
+                  <a:schemeClr val="tx1"/>
+                </a:solidFill>
+              </a:defRPr>
+            </a:lvl1pPr>
+          </a:lstStyle>
+          <a:p>
+            <a:r>
+              <a:rPr lang="en-US"/>
+              <a:t>Question 2</a:t>
+            </a:r>
+          </a:p>
+        </p:txBody>
+      </p:sp>
+      <p:sp>
+        <p:nvSpPr>
+          <p:cNvPr id="3" name="Subtitle"/>
+          <p:cNvSpPr>
+            <a:spLocks noGrp="1"/>
+          </p:cNvSpPr>
+          <p:nvPr>
+            <p:ph sz="quarter" idx="10"/>
+          </p:nvPr>
+        </p:nvSpPr>
+        <p:spPr>
+          <a:xfrm>
+            <a:off x="584200" y="1435100"/>
+            <a:ext cx="11018838" cy="853440"/>
+          </a:xfrm>
+        </p:spPr>
+        <p:txBody>
+          <a:bodyPr/>
+          <a:lstStyle>
+            <a:lvl1pPr marL="0" indent="0">
+              <a:buNone/>
+              <a:defRPr>
+                <a:solidFill>
+                  <a:schemeClr val="tx1"/>
+                </a:solidFill>
+              </a:defRPr>
+            </a:lvl1pPr>
+            <a:lvl2pPr>
+              <a:defRPr>
+                <a:solidFill>
+                  <a:schemeClr val="tx1"/>
+                </a:solidFill>
+              </a:defRPr>
+            </a:lvl2pPr>
+            <a:lvl3pPr>
+              <a:defRPr>
+                <a:solidFill>
+                  <a:schemeClr val="tx1"/>
+                </a:solidFill>
+              </a:defRPr>
+            </a:lvl3pPr>
+            <a:lvl4pPr>
+              <a:defRPr>
+                <a:solidFill>
+                  <a:schemeClr val="tx1"/>
+                </a:solidFill>
+              </a:defRPr>
+            </a:lvl4pPr>
+            <a:lvl5pPr>
+              <a:defRPr>
+                <a:solidFill>
+                  <a:schemeClr val="tx1"/>
+                </a:solidFill>
+              </a:defRPr>
+            </a:lvl5pPr>
+          </a:lstStyle>
+          <a:p>
+            <a:r>
+              <a:t>We want to train a neural network to generate new funny words for a children's book. Which architecture can we use?</a:t>
+            </a:r>
+          </a:p>
+        </p:txBody>
+      </p:sp>
+      <p:sp>
+        <p:nvSpPr>
+          <p:cNvPr id="4" name="New shape"/>
+          <p:cNvSpPr/>
+          <p:nvPr/>
+        </p:nvSpPr>
+        <p:spPr>
+          <a:xfrm>
+            <a:off x="586581" y="2745486"/>
+            <a:ext cx="11018838" cy="3655568"/>
+          </a:xfrm>
+          <a:prstGeom prst="rect">
+            <a:avLst/>
+          </a:prstGeom>
+          <a:noFill/>
+          <a:ln>
+            <a:noFill/>
+          </a:ln>
+        </p:spPr>
+        <p:style>
+          <a:lnRef idx="2">
+            <a:schemeClr val="accent1">
+              <a:shade val="50000"/>
+            </a:schemeClr>
+          </a:lnRef>
+          <a:fillRef idx="1">
+            <a:schemeClr val="accent1"/>
+          </a:fillRef>
+          <a:effectRef idx="0">
+            <a:schemeClr val="accent1"/>
+          </a:effectRef>
+          <a:fontRef idx="minor">
+            <a:schemeClr val="lt1"/>
+          </a:fontRef>
+        </p:style>
+        <p:txBody>
+          <a:bodyPr wrap="square" rtlCol="0" anchor="t"/>
+          <a:lstStyle/>
+          <a:p>
+            <a:pPr lvl="1" indent="-457200">
+              <a:spcAft>
+                <a:spcPct val="15000"/>
+              </a:spcAft>
+              <a:buAutoNum type="alphaUcPeriod"/>
+            </a:pPr>
+            <a:r>
+              <a:rPr sz="2500">
+                <a:solidFill>
+                  <a:srgbClr val="000000"/>
+                </a:solidFill>
+              </a:rPr>
+              <a:t>Word-level LSTM</a:t>
+            </a:r>
+          </a:p>
+          <a:p>
+            <a:pPr lvl="1" indent="-457200">
+              <a:spcAft>
+                <a:spcPct val="15000"/>
+              </a:spcAft>
+              <a:buAutoNum type="alphaUcPeriod"/>
+            </a:pPr>
+            <a:r>
+              <a:rPr sz="2500">
+                <a:solidFill>
+                  <a:srgbClr val="000000"/>
+                </a:solidFill>
+              </a:rPr>
+              <a:t>Character-level LSTM</a:t>
+            </a:r>
+          </a:p>
+          <a:p>
+            <a:pPr lvl="1" indent="-457200">
+              <a:spcAft>
+                <a:spcPct val="15000"/>
+              </a:spcAft>
+              <a:buAutoNum type="alphaUcPeriod"/>
+            </a:pPr>
+            <a:r>
+              <a:rPr sz="2500">
+                <a:solidFill>
+                  <a:srgbClr val="000000"/>
+                </a:solidFill>
+              </a:rPr>
+              <a:t>Word-level RNN</a:t>
+            </a:r>
+          </a:p>
+          <a:p>
+            <a:pPr lvl="1" indent="-457200">
+              <a:spcAft>
+                <a:spcPct val="15000"/>
+              </a:spcAft>
+              <a:buAutoNum type="alphaUcPeriod"/>
+            </a:pPr>
+            <a:r>
+              <a:rPr sz="2500">
+                <a:solidFill>
+                  <a:srgbClr val="000000"/>
+                </a:solidFill>
+              </a:rPr>
+              <a:t>Character-level perceptron</a:t>
+            </a:r>
+          </a:p>
+        </p:txBody>
+      </p:sp>
+    </p:spTree>
+  </p:cSld>
+  <p:clrMapOvr>
+    <a:masterClrMapping/>
+  </p:clrMapOvr>
+  <p:transition/>
+</p:sld>
+</file>
+
+<file path=ppt/slides/slide16.xml><?xml version="1.0" encoding="utf-8"?>
+<p:sld xmlns:a="http://schemas.openxmlformats.org/drawingml/2006/main" xmlns:r="http://schemas.openxmlformats.org/officeDocument/2006/relationships" xmlns:p="http://schemas.openxmlformats.org/presentationml/2006/main">
+  <p:cSld>
+    <p:spTree>
+      <p:nvGrpSpPr>
+        <p:cNvPr id="1" name=""/>
+        <p:cNvGrpSpPr/>
+        <p:nvPr/>
+      </p:nvGrpSpPr>
+      <p:grpSpPr>
+        <a:xfrm>
+          <a:off x="0" y="0"/>
+          <a:ext cx="0" cy="0"/>
+          <a:chOff x="0" y="0"/>
+          <a:chExt cx="0" cy="0"/>
+        </a:xfrm>
+      </p:grpSpPr>
+      <p:sp>
+        <p:nvSpPr>
+          <p:cNvPr id="2" name="Title"/>
+          <p:cNvSpPr>
+            <a:spLocks noGrp="1"/>
+          </p:cNvSpPr>
+          <p:nvPr>
+            <p:ph type="title"/>
+          </p:nvPr>
+        </p:nvSpPr>
+        <p:spPr>
+          <a:xfrm>
+            <a:off x="588263" y="457200"/>
+            <a:ext cx="11018520" cy="548640"/>
+          </a:xfrm>
+        </p:spPr>
+        <p:txBody>
+          <a:bodyPr/>
+          <a:lstStyle>
+            <a:lvl1pPr>
+              <a:defRPr>
+                <a:solidFill>
+                  <a:schemeClr val="tx1"/>
+                </a:solidFill>
+              </a:defRPr>
+            </a:lvl1pPr>
+          </a:lstStyle>
+          <a:p>
+            <a:r>
+              <a:rPr lang="en-US"/>
+              <a:t>Question 2</a:t>
+            </a:r>
+          </a:p>
+        </p:txBody>
+      </p:sp>
+      <p:sp>
+        <p:nvSpPr>
+          <p:cNvPr id="3" name="Subtitle"/>
+          <p:cNvSpPr>
+            <a:spLocks noGrp="1"/>
+          </p:cNvSpPr>
+          <p:nvPr>
+            <p:ph sz="quarter" idx="10"/>
+          </p:nvPr>
+        </p:nvSpPr>
+        <p:spPr>
+          <a:xfrm>
+            <a:off x="584200" y="1435100"/>
+            <a:ext cx="11018838" cy="853440"/>
+          </a:xfrm>
+        </p:spPr>
+        <p:txBody>
+          <a:bodyPr/>
+          <a:lstStyle>
+            <a:lvl1pPr marL="0" indent="0">
+              <a:buNone/>
+              <a:defRPr>
+                <a:solidFill>
+                  <a:schemeClr val="tx1"/>
+                </a:solidFill>
+              </a:defRPr>
+            </a:lvl1pPr>
+            <a:lvl2pPr>
+              <a:defRPr>
+                <a:solidFill>
+                  <a:schemeClr val="tx1"/>
+                </a:solidFill>
+              </a:defRPr>
+            </a:lvl2pPr>
+            <a:lvl3pPr>
+              <a:defRPr>
+                <a:solidFill>
+                  <a:schemeClr val="tx1"/>
+                </a:solidFill>
+              </a:defRPr>
+            </a:lvl3pPr>
+            <a:lvl4pPr>
+              <a:defRPr>
+                <a:solidFill>
+                  <a:schemeClr val="tx1"/>
+                </a:solidFill>
+              </a:defRPr>
+            </a:lvl4pPr>
+            <a:lvl5pPr>
+              <a:defRPr>
+                <a:solidFill>
+                  <a:schemeClr val="tx1"/>
+                </a:solidFill>
+              </a:defRPr>
+            </a:lvl5pPr>
+          </a:lstStyle>
+          <a:p>
+            <a:r>
+              <a:t>We want to train a neural network to generate new funny words for a children's book. Which architecture can we use?</a:t>
+            </a:r>
+          </a:p>
+        </p:txBody>
+      </p:sp>
+      <p:sp>
+        <p:nvSpPr>
+          <p:cNvPr id="4" name="New shape"/>
+          <p:cNvSpPr/>
+          <p:nvPr/>
+        </p:nvSpPr>
+        <p:spPr>
+          <a:xfrm>
+            <a:off x="586581" y="2745486"/>
+            <a:ext cx="11018838" cy="3655568"/>
+          </a:xfrm>
+          <a:prstGeom prst="rect">
+            <a:avLst/>
+          </a:prstGeom>
+          <a:noFill/>
+          <a:ln>
+            <a:noFill/>
+          </a:ln>
+        </p:spPr>
+        <p:style>
+          <a:lnRef idx="2">
+            <a:schemeClr val="accent1">
+              <a:shade val="50000"/>
+            </a:schemeClr>
+          </a:lnRef>
+          <a:fillRef idx="1">
+            <a:schemeClr val="accent1"/>
+          </a:fillRef>
+          <a:effectRef idx="0">
+            <a:schemeClr val="accent1"/>
+          </a:effectRef>
+          <a:fontRef idx="minor">
+            <a:schemeClr val="lt1"/>
+          </a:fontRef>
+        </p:style>
+        <p:txBody>
+          <a:bodyPr wrap="square" rtlCol="0" anchor="t"/>
+          <a:lstStyle/>
+          <a:p>
+            <a:pPr lvl="1" indent="-457200">
+              <a:spcAft>
+                <a:spcPct val="15000"/>
+              </a:spcAft>
+              <a:buAutoNum type="alphaUcPeriod"/>
+            </a:pPr>
+            <a:r>
+              <a:rPr sz="2500">
+                <a:solidFill>
+                  <a:srgbClr val="000000"/>
+                </a:solidFill>
+              </a:rPr>
+              <a:t>Word-level LSTM</a:t>
+            </a:r>
+          </a:p>
+          <a:p>
+            <a:pPr lvl="1" indent="-457200">
+              <a:spcAft>
+                <a:spcPct val="15000"/>
+              </a:spcAft>
+              <a:buAutoNum type="alphaUcPeriod"/>
+            </a:pPr>
+            <a:r>
+              <a:rPr sz="2500" b="1">
+                <a:solidFill>
+                  <a:srgbClr val="000000"/>
+                </a:solidFill>
+                <a:highlight>
+                  <a:srgbClr val="F0F788"/>
+                </a:highlight>
+              </a:rPr>
+              <a:t>Character-level LSTM</a:t>
+            </a:r>
+          </a:p>
+          <a:p>
+            <a:pPr lvl="1" indent="-457200">
+              <a:spcAft>
+                <a:spcPct val="15000"/>
+              </a:spcAft>
+              <a:buAutoNum type="alphaUcPeriod"/>
+            </a:pPr>
+            <a:r>
+              <a:rPr sz="2500">
+                <a:solidFill>
+                  <a:srgbClr val="000000"/>
+                </a:solidFill>
+              </a:rPr>
+              <a:t>Word-level RNN</a:t>
+            </a:r>
+          </a:p>
+          <a:p>
+            <a:pPr lvl="1" indent="-457200">
+              <a:spcAft>
+                <a:spcPct val="15000"/>
+              </a:spcAft>
+              <a:buAutoNum type="alphaUcPeriod"/>
+            </a:pPr>
+            <a:r>
+              <a:rPr sz="2500">
+                <a:solidFill>
+                  <a:srgbClr val="000000"/>
+                </a:solidFill>
+              </a:rPr>
+              <a:t>Character-level perceptron</a:t>
+            </a:r>
+          </a:p>
+        </p:txBody>
+      </p:sp>
+    </p:spTree>
+  </p:cSld>
+  <p:clrMapOvr>
+    <a:masterClrMapping/>
+  </p:clrMapOvr>
+  <p:transition/>
+</p:sld>
+</file>
+
+<file path=ppt/slides/slide17.xml><?xml version="1.0" encoding="utf-8"?>
+<p:sld xmlns:a="http://schemas.openxmlformats.org/drawingml/2006/main" xmlns:r="http://schemas.openxmlformats.org/officeDocument/2006/relationships" xmlns:p="http://schemas.openxmlformats.org/presentationml/2006/main">
+  <p:cSld>
+    <p:spTree>
+      <p:nvGrpSpPr>
+        <p:cNvPr id="1" name=""/>
+        <p:cNvGrpSpPr/>
+        <p:nvPr/>
+      </p:nvGrpSpPr>
+      <p:grpSpPr>
+        <a:xfrm>
+          <a:off x="0" y="0"/>
+          <a:ext cx="0" cy="0"/>
+          <a:chOff x="0" y="0"/>
+          <a:chExt cx="0" cy="0"/>
+        </a:xfrm>
+      </p:grpSpPr>
+      <p:sp>
+        <p:nvSpPr>
+          <p:cNvPr id="2" name="Title"/>
+          <p:cNvSpPr>
+            <a:spLocks noGrp="1"/>
+          </p:cNvSpPr>
+          <p:nvPr>
+            <p:ph type="title"/>
+          </p:nvPr>
+        </p:nvSpPr>
+        <p:spPr>
+          <a:xfrm>
+            <a:off x="588263" y="457200"/>
+            <a:ext cx="11018520" cy="548640"/>
+          </a:xfrm>
+        </p:spPr>
+        <p:txBody>
+          <a:bodyPr/>
+          <a:lstStyle>
+            <a:lvl1pPr>
+              <a:defRPr>
+                <a:solidFill>
+                  <a:schemeClr val="tx1"/>
+                </a:solidFill>
+              </a:defRPr>
+            </a:lvl1pPr>
+          </a:lstStyle>
+          <a:p>
+            <a:r>
+              <a:rPr lang="en-US"/>
+              <a:t>Question 3</a:t>
+            </a:r>
+          </a:p>
+        </p:txBody>
+      </p:sp>
+      <p:sp>
+        <p:nvSpPr>
+          <p:cNvPr id="3" name="Subtitle"/>
+          <p:cNvSpPr>
+            <a:spLocks noGrp="1"/>
+          </p:cNvSpPr>
+          <p:nvPr>
+            <p:ph sz="quarter" idx="10"/>
+          </p:nvPr>
+        </p:nvSpPr>
+        <p:spPr>
+          <a:xfrm>
+            <a:off x="584200" y="1435100"/>
+            <a:ext cx="11018838" cy="426720"/>
+          </a:xfrm>
+        </p:spPr>
+        <p:txBody>
+          <a:bodyPr/>
+          <a:lstStyle>
+            <a:lvl1pPr marL="0" indent="0">
+              <a:buNone/>
+              <a:defRPr>
+                <a:solidFill>
+                  <a:schemeClr val="tx1"/>
+                </a:solidFill>
+              </a:defRPr>
+            </a:lvl1pPr>
+            <a:lvl2pPr>
+              <a:defRPr>
+                <a:solidFill>
+                  <a:schemeClr val="tx1"/>
+                </a:solidFill>
+              </a:defRPr>
+            </a:lvl2pPr>
+            <a:lvl3pPr>
+              <a:defRPr>
+                <a:solidFill>
+                  <a:schemeClr val="tx1"/>
+                </a:solidFill>
+              </a:defRPr>
+            </a:lvl3pPr>
+            <a:lvl4pPr>
+              <a:defRPr>
+                <a:solidFill>
+                  <a:schemeClr val="tx1"/>
+                </a:solidFill>
+              </a:defRPr>
+            </a:lvl4pPr>
+            <a:lvl5pPr>
+              <a:defRPr>
+                <a:solidFill>
+                  <a:schemeClr val="tx1"/>
+                </a:solidFill>
+              </a:defRPr>
+            </a:lvl5pPr>
+          </a:lstStyle>
+          <a:p>
+            <a:r>
+              <a:t>Recurrent neural network is called recurrent, because:</a:t>
+            </a:r>
+          </a:p>
+        </p:txBody>
+      </p:sp>
+      <p:sp>
+        <p:nvSpPr>
+          <p:cNvPr id="4" name="New shape"/>
+          <p:cNvSpPr/>
+          <p:nvPr/>
+        </p:nvSpPr>
+        <p:spPr>
+          <a:xfrm>
+            <a:off x="586581" y="2361438"/>
+            <a:ext cx="11018838" cy="3996944"/>
+          </a:xfrm>
+          <a:prstGeom prst="rect">
+            <a:avLst/>
+          </a:prstGeom>
+          <a:noFill/>
+          <a:ln>
+            <a:noFill/>
+          </a:ln>
+        </p:spPr>
+        <p:style>
+          <a:lnRef idx="2">
+            <a:schemeClr val="accent1">
+              <a:shade val="50000"/>
+            </a:schemeClr>
+          </a:lnRef>
+          <a:fillRef idx="1">
+            <a:schemeClr val="accent1"/>
+          </a:fillRef>
+          <a:effectRef idx="0">
+            <a:schemeClr val="accent1"/>
+          </a:effectRef>
+          <a:fontRef idx="minor">
+            <a:schemeClr val="lt1"/>
+          </a:fontRef>
+        </p:style>
+        <p:txBody>
+          <a:bodyPr wrap="square" rtlCol="0" anchor="t"/>
+          <a:lstStyle/>
+          <a:p>
+            <a:pPr lvl="1" indent="-457200">
+              <a:spcAft>
+                <a:spcPct val="15000"/>
+              </a:spcAft>
+              <a:buAutoNum type="alphaUcPeriod"/>
+            </a:pPr>
+            <a:r>
+              <a:rPr sz="2500">
+                <a:solidFill>
+                  <a:srgbClr val="000000"/>
+                </a:solidFill>
+              </a:rPr>
+              <a:t>A network is applied for each input element and output from the previous application is passed to the next one</a:t>
+            </a:r>
+          </a:p>
+          <a:p>
+            <a:pPr lvl="1" indent="-457200">
+              <a:spcAft>
+                <a:spcPct val="15000"/>
+              </a:spcAft>
+              <a:buAutoNum type="alphaUcPeriod"/>
+            </a:pPr>
+            <a:r>
+              <a:rPr sz="2500">
+                <a:solidFill>
+                  <a:srgbClr val="000000"/>
+                </a:solidFill>
+              </a:rPr>
+              <a:t>It is trained by a recurrent process</a:t>
+            </a:r>
+          </a:p>
+          <a:p>
+            <a:pPr lvl="1" indent="-457200">
+              <a:spcAft>
+                <a:spcPct val="15000"/>
+              </a:spcAft>
+              <a:buAutoNum type="alphaUcPeriod"/>
+            </a:pPr>
+            <a:r>
+              <a:rPr sz="2500">
+                <a:solidFill>
+                  <a:srgbClr val="000000"/>
+                </a:solidFill>
+              </a:rPr>
+              <a:t>It consists of layers which include other subnetworks</a:t>
+            </a:r>
+          </a:p>
+        </p:txBody>
+      </p:sp>
+    </p:spTree>
+  </p:cSld>
+  <p:clrMapOvr>
+    <a:masterClrMapping/>
+  </p:clrMapOvr>
+  <p:transition/>
+</p:sld>
+</file>
+
+<file path=ppt/slides/slide18.xml><?xml version="1.0" encoding="utf-8"?>
+<p:sld xmlns:a="http://schemas.openxmlformats.org/drawingml/2006/main" xmlns:r="http://schemas.openxmlformats.org/officeDocument/2006/relationships" xmlns:p="http://schemas.openxmlformats.org/presentationml/2006/main">
+  <p:cSld>
+    <p:spTree>
+      <p:nvGrpSpPr>
+        <p:cNvPr id="1" name=""/>
+        <p:cNvGrpSpPr/>
+        <p:nvPr/>
+      </p:nvGrpSpPr>
+      <p:grpSpPr>
+        <a:xfrm>
+          <a:off x="0" y="0"/>
+          <a:ext cx="0" cy="0"/>
+          <a:chOff x="0" y="0"/>
+          <a:chExt cx="0" cy="0"/>
+        </a:xfrm>
+      </p:grpSpPr>
+      <p:sp>
+        <p:nvSpPr>
+          <p:cNvPr id="2" name="Title"/>
+          <p:cNvSpPr>
+            <a:spLocks noGrp="1"/>
+          </p:cNvSpPr>
+          <p:nvPr>
+            <p:ph type="title"/>
+          </p:nvPr>
+        </p:nvSpPr>
+        <p:spPr>
+          <a:xfrm>
+            <a:off x="588263" y="457200"/>
+            <a:ext cx="11018520" cy="548640"/>
+          </a:xfrm>
+        </p:spPr>
+        <p:txBody>
+          <a:bodyPr/>
+          <a:lstStyle>
+            <a:lvl1pPr>
+              <a:defRPr>
+                <a:solidFill>
+                  <a:schemeClr val="tx1"/>
+                </a:solidFill>
+              </a:defRPr>
+            </a:lvl1pPr>
+          </a:lstStyle>
+          <a:p>
+            <a:r>
+              <a:rPr lang="en-US"/>
+              <a:t>Question 3</a:t>
+            </a:r>
+          </a:p>
+        </p:txBody>
+      </p:sp>
+      <p:sp>
+        <p:nvSpPr>
+          <p:cNvPr id="3" name="Subtitle"/>
+          <p:cNvSpPr>
+            <a:spLocks noGrp="1"/>
+          </p:cNvSpPr>
+          <p:nvPr>
+            <p:ph sz="quarter" idx="10"/>
+          </p:nvPr>
+        </p:nvSpPr>
+        <p:spPr>
+          <a:xfrm>
+            <a:off x="584200" y="1435100"/>
+            <a:ext cx="11018838" cy="426720"/>
+          </a:xfrm>
+        </p:spPr>
+        <p:txBody>
+          <a:bodyPr/>
+          <a:lstStyle>
+            <a:lvl1pPr marL="0" indent="0">
+              <a:buNone/>
+              <a:defRPr>
+                <a:solidFill>
+                  <a:schemeClr val="tx1"/>
+                </a:solidFill>
+              </a:defRPr>
+            </a:lvl1pPr>
+            <a:lvl2pPr>
+              <a:defRPr>
+                <a:solidFill>
+                  <a:schemeClr val="tx1"/>
+                </a:solidFill>
+              </a:defRPr>
+            </a:lvl2pPr>
+            <a:lvl3pPr>
+              <a:defRPr>
+                <a:solidFill>
+                  <a:schemeClr val="tx1"/>
+                </a:solidFill>
+              </a:defRPr>
+            </a:lvl3pPr>
+            <a:lvl4pPr>
+              <a:defRPr>
+                <a:solidFill>
+                  <a:schemeClr val="tx1"/>
+                </a:solidFill>
+              </a:defRPr>
+            </a:lvl4pPr>
+            <a:lvl5pPr>
+              <a:defRPr>
+                <a:solidFill>
+                  <a:schemeClr val="tx1"/>
+                </a:solidFill>
+              </a:defRPr>
+            </a:lvl5pPr>
+          </a:lstStyle>
+          <a:p>
+            <a:r>
+              <a:t>Recurrent neural network is called recurrent, because:</a:t>
+            </a:r>
+          </a:p>
+        </p:txBody>
+      </p:sp>
+      <p:sp>
+        <p:nvSpPr>
+          <p:cNvPr id="4" name="New shape"/>
+          <p:cNvSpPr/>
+          <p:nvPr/>
+        </p:nvSpPr>
+        <p:spPr>
+          <a:xfrm>
+            <a:off x="586581" y="2361438"/>
+            <a:ext cx="11018838" cy="3996944"/>
+          </a:xfrm>
+          <a:prstGeom prst="rect">
+            <a:avLst/>
+          </a:prstGeom>
+          <a:noFill/>
+          <a:ln>
+            <a:noFill/>
+          </a:ln>
+        </p:spPr>
+        <p:style>
+          <a:lnRef idx="2">
+            <a:schemeClr val="accent1">
+              <a:shade val="50000"/>
+            </a:schemeClr>
+          </a:lnRef>
+          <a:fillRef idx="1">
+            <a:schemeClr val="accent1"/>
+          </a:fillRef>
+          <a:effectRef idx="0">
+            <a:schemeClr val="accent1"/>
+          </a:effectRef>
+          <a:fontRef idx="minor">
+            <a:schemeClr val="lt1"/>
+          </a:fontRef>
+        </p:style>
+        <p:txBody>
+          <a:bodyPr wrap="square" rtlCol="0" anchor="t"/>
+          <a:lstStyle/>
+          <a:p>
+            <a:pPr lvl="1" indent="-457200">
+              <a:spcAft>
+                <a:spcPct val="15000"/>
+              </a:spcAft>
+              <a:buAutoNum type="alphaUcPeriod"/>
+            </a:pPr>
+            <a:r>
+              <a:rPr sz="2500" b="1">
+                <a:solidFill>
+                  <a:srgbClr val="000000"/>
+                </a:solidFill>
+                <a:highlight>
+                  <a:srgbClr val="F0F788"/>
+                </a:highlight>
+              </a:rPr>
+              <a:t>A network is applied for each input element and output from the previous application is passed to the next one</a:t>
+            </a:r>
+          </a:p>
+          <a:p>
+            <a:pPr lvl="1" indent="-457200">
+              <a:spcAft>
+                <a:spcPct val="15000"/>
+              </a:spcAft>
+              <a:buAutoNum type="alphaUcPeriod"/>
+            </a:pPr>
+            <a:r>
+              <a:rPr sz="2500">
+                <a:solidFill>
+                  <a:srgbClr val="000000"/>
+                </a:solidFill>
+              </a:rPr>
+              <a:t>It is trained by a recurrent process</a:t>
+            </a:r>
+          </a:p>
+          <a:p>
+            <a:pPr lvl="1" indent="-457200">
+              <a:spcAft>
+                <a:spcPct val="15000"/>
+              </a:spcAft>
+              <a:buAutoNum type="alphaUcPeriod"/>
+            </a:pPr>
+            <a:r>
+              <a:rPr sz="2500">
+                <a:solidFill>
+                  <a:srgbClr val="000000"/>
+                </a:solidFill>
+              </a:rPr>
+              <a:t>It consists of layers which include other subnetworks</a:t>
+            </a:r>
+          </a:p>
+        </p:txBody>
+      </p:sp>
+    </p:spTree>
+  </p:cSld>
+  <p:clrMapOvr>
+    <a:masterClrMapping/>
+  </p:clrMapOvr>
+  <p:transition/>
+</p:sld>
+</file>
+
+<file path=ppt/slides/slide19.xml><?xml version="1.0" encoding="utf-8"?>
+<p:sld xmlns:a="http://schemas.openxmlformats.org/drawingml/2006/main" xmlns:r="http://schemas.openxmlformats.org/officeDocument/2006/relationships" xmlns:p="http://schemas.openxmlformats.org/presentationml/2006/main">
+  <p:cSld>
+    <p:spTree>
+      <p:nvGrpSpPr>
+        <p:cNvPr id="1" name=""/>
+        <p:cNvGrpSpPr/>
+        <p:nvPr/>
+      </p:nvGrpSpPr>
+      <p:grpSpPr>
+        <a:xfrm>
+          <a:off x="0" y="0"/>
+          <a:ext cx="0" cy="0"/>
+          <a:chOff x="0" y="0"/>
+          <a:chExt cx="0" cy="0"/>
+        </a:xfrm>
+      </p:grpSpPr>
+      <p:sp>
+        <p:nvSpPr>
+          <p:cNvPr id="2" name="Title"/>
+          <p:cNvSpPr>
+            <a:spLocks noGrp="1"/>
+          </p:cNvSpPr>
+          <p:nvPr>
+            <p:ph type="title"/>
+          </p:nvPr>
+        </p:nvSpPr>
+        <p:spPr>
+          <a:xfrm>
+            <a:off x="588263" y="457200"/>
+            <a:ext cx="11018520" cy="548640"/>
+          </a:xfrm>
+        </p:spPr>
+        <p:txBody>
+          <a:bodyPr/>
+          <a:lstStyle>
+            <a:lvl1pPr>
+              <a:defRPr>
+                <a:solidFill>
+                  <a:schemeClr val="tx1"/>
+                </a:solidFill>
+              </a:defRPr>
+            </a:lvl1pPr>
+          </a:lstStyle>
+          <a:p>
+            <a:r>
+              <a:rPr lang="en-US"/>
+              <a:t>Question 4</a:t>
+            </a:r>
+          </a:p>
+        </p:txBody>
+      </p:sp>
+      <p:sp>
+        <p:nvSpPr>
+          <p:cNvPr id="3" name="Subtitle"/>
+          <p:cNvSpPr>
+            <a:spLocks noGrp="1"/>
+          </p:cNvSpPr>
+          <p:nvPr>
+            <p:ph sz="quarter" idx="10"/>
+          </p:nvPr>
+        </p:nvSpPr>
+        <p:spPr>
+          <a:xfrm>
+            <a:off x="584200" y="1435100"/>
+            <a:ext cx="11018838" cy="426720"/>
+          </a:xfrm>
+        </p:spPr>
+        <p:txBody>
+          <a:bodyPr/>
+          <a:lstStyle>
+            <a:lvl1pPr marL="0" indent="0">
+              <a:buNone/>
+              <a:defRPr>
+                <a:solidFill>
+                  <a:schemeClr val="tx1"/>
+                </a:solidFill>
+              </a:defRPr>
+            </a:lvl1pPr>
+            <a:lvl2pPr>
+              <a:defRPr>
+                <a:solidFill>
+                  <a:schemeClr val="tx1"/>
+                </a:solidFill>
+              </a:defRPr>
+            </a:lvl2pPr>
+            <a:lvl3pPr>
+              <a:defRPr>
+                <a:solidFill>
+                  <a:schemeClr val="tx1"/>
+                </a:solidFill>
+              </a:defRPr>
+            </a:lvl3pPr>
+            <a:lvl4pPr>
+              <a:defRPr>
+                <a:solidFill>
+                  <a:schemeClr val="tx1"/>
+                </a:solidFill>
+              </a:defRPr>
+            </a:lvl4pPr>
+            <a:lvl5pPr>
+              <a:defRPr>
+                <a:solidFill>
+                  <a:schemeClr val="tx1"/>
+                </a:solidFill>
+              </a:defRPr>
+            </a:lvl5pPr>
+          </a:lstStyle>
+          <a:p>
+            <a:r>
+              <a:t>What is the main idea behind LSTM network architecture?</a:t>
+            </a:r>
+          </a:p>
+        </p:txBody>
+      </p:sp>
+      <p:sp>
+        <p:nvSpPr>
+          <p:cNvPr id="4" name="New shape"/>
+          <p:cNvSpPr/>
+          <p:nvPr/>
+        </p:nvSpPr>
+        <p:spPr>
+          <a:xfrm>
+            <a:off x="586581" y="2361438"/>
+            <a:ext cx="11018838" cy="3996944"/>
+          </a:xfrm>
+          <a:prstGeom prst="rect">
+            <a:avLst/>
+          </a:prstGeom>
+          <a:noFill/>
+          <a:ln>
+            <a:noFill/>
+          </a:ln>
+        </p:spPr>
+        <p:style>
+          <a:lnRef idx="2">
+            <a:schemeClr val="accent1">
+              <a:shade val="50000"/>
+            </a:schemeClr>
+          </a:lnRef>
+          <a:fillRef idx="1">
+            <a:schemeClr val="accent1"/>
+          </a:fillRef>
+          <a:effectRef idx="0">
+            <a:schemeClr val="accent1"/>
+          </a:effectRef>
+          <a:fontRef idx="minor">
+            <a:schemeClr val="lt1"/>
+          </a:fontRef>
+        </p:style>
+        <p:txBody>
+          <a:bodyPr wrap="square" rtlCol="0" anchor="t"/>
+          <a:lstStyle/>
+          <a:p>
+            <a:pPr lvl="1" indent="-457200">
+              <a:spcAft>
+                <a:spcPct val="15000"/>
+              </a:spcAft>
+              <a:buAutoNum type="alphaUcPeriod"/>
+            </a:pPr>
+            <a:r>
+              <a:rPr sz="2500">
+                <a:solidFill>
+                  <a:srgbClr val="000000"/>
+                </a:solidFill>
+              </a:rPr>
+              <a:t>Fixed number of LSTM blocks for the whole dataset</a:t>
+            </a:r>
+          </a:p>
+          <a:p>
+            <a:pPr lvl="1" indent="-457200">
+              <a:spcAft>
+                <a:spcPct val="15000"/>
+              </a:spcAft>
+              <a:buAutoNum type="alphaUcPeriod"/>
+            </a:pPr>
+            <a:r>
+              <a:rPr sz="2500">
+                <a:solidFill>
+                  <a:srgbClr val="000000"/>
+                </a:solidFill>
+              </a:rPr>
+              <a:t>It contains many layers of recurrent neural networks</a:t>
+            </a:r>
+          </a:p>
+          <a:p>
+            <a:pPr lvl="1" indent="-457200">
+              <a:spcAft>
+                <a:spcPct val="15000"/>
+              </a:spcAft>
+              <a:buAutoNum type="alphaUcPeriod"/>
+            </a:pPr>
+            <a:r>
+              <a:rPr sz="2500">
+                <a:solidFill>
+                  <a:srgbClr val="000000"/>
+                </a:solidFill>
+              </a:rPr>
+              <a:t>Explicit state management with forgetting and state triggering</a:t>
+            </a:r>
+          </a:p>
+        </p:txBody>
+      </p:sp>
     </p:spTree>
   </p:cSld>
   <p:clrMapOvr>
@@ -53273,6 +55467,881 @@
           </a:p>
         </p:txBody>
       </p:sp>
+    </p:spTree>
+  </p:cSld>
+  <p:clrMapOvr>
+    <a:masterClrMapping/>
+  </p:clrMapOvr>
+  <p:transition/>
+</p:sld>
+</file>
+
+<file path=ppt/slides/slide20.xml><?xml version="1.0" encoding="utf-8"?>
+<p:sld xmlns:a="http://schemas.openxmlformats.org/drawingml/2006/main" xmlns:r="http://schemas.openxmlformats.org/officeDocument/2006/relationships" xmlns:p="http://schemas.openxmlformats.org/presentationml/2006/main">
+  <p:cSld>
+    <p:spTree>
+      <p:nvGrpSpPr>
+        <p:cNvPr id="1" name=""/>
+        <p:cNvGrpSpPr/>
+        <p:nvPr/>
+      </p:nvGrpSpPr>
+      <p:grpSpPr>
+        <a:xfrm>
+          <a:off x="0" y="0"/>
+          <a:ext cx="0" cy="0"/>
+          <a:chOff x="0" y="0"/>
+          <a:chExt cx="0" cy="0"/>
+        </a:xfrm>
+      </p:grpSpPr>
+      <p:sp>
+        <p:nvSpPr>
+          <p:cNvPr id="2" name="Title"/>
+          <p:cNvSpPr>
+            <a:spLocks noGrp="1"/>
+          </p:cNvSpPr>
+          <p:nvPr>
+            <p:ph type="title"/>
+          </p:nvPr>
+        </p:nvSpPr>
+        <p:spPr>
+          <a:xfrm>
+            <a:off x="588263" y="457200"/>
+            <a:ext cx="11018520" cy="548640"/>
+          </a:xfrm>
+        </p:spPr>
+        <p:txBody>
+          <a:bodyPr/>
+          <a:lstStyle>
+            <a:lvl1pPr>
+              <a:defRPr>
+                <a:solidFill>
+                  <a:schemeClr val="tx1"/>
+                </a:solidFill>
+              </a:defRPr>
+            </a:lvl1pPr>
+          </a:lstStyle>
+          <a:p>
+            <a:r>
+              <a:rPr lang="en-US"/>
+              <a:t>Question 4</a:t>
+            </a:r>
+          </a:p>
+        </p:txBody>
+      </p:sp>
+      <p:sp>
+        <p:nvSpPr>
+          <p:cNvPr id="3" name="Subtitle"/>
+          <p:cNvSpPr>
+            <a:spLocks noGrp="1"/>
+          </p:cNvSpPr>
+          <p:nvPr>
+            <p:ph sz="quarter" idx="10"/>
+          </p:nvPr>
+        </p:nvSpPr>
+        <p:spPr>
+          <a:xfrm>
+            <a:off x="584200" y="1435100"/>
+            <a:ext cx="11018838" cy="426720"/>
+          </a:xfrm>
+        </p:spPr>
+        <p:txBody>
+          <a:bodyPr/>
+          <a:lstStyle>
+            <a:lvl1pPr marL="0" indent="0">
+              <a:buNone/>
+              <a:defRPr>
+                <a:solidFill>
+                  <a:schemeClr val="tx1"/>
+                </a:solidFill>
+              </a:defRPr>
+            </a:lvl1pPr>
+            <a:lvl2pPr>
+              <a:defRPr>
+                <a:solidFill>
+                  <a:schemeClr val="tx1"/>
+                </a:solidFill>
+              </a:defRPr>
+            </a:lvl2pPr>
+            <a:lvl3pPr>
+              <a:defRPr>
+                <a:solidFill>
+                  <a:schemeClr val="tx1"/>
+                </a:solidFill>
+              </a:defRPr>
+            </a:lvl3pPr>
+            <a:lvl4pPr>
+              <a:defRPr>
+                <a:solidFill>
+                  <a:schemeClr val="tx1"/>
+                </a:solidFill>
+              </a:defRPr>
+            </a:lvl4pPr>
+            <a:lvl5pPr>
+              <a:defRPr>
+                <a:solidFill>
+                  <a:schemeClr val="tx1"/>
+                </a:solidFill>
+              </a:defRPr>
+            </a:lvl5pPr>
+          </a:lstStyle>
+          <a:p>
+            <a:r>
+              <a:t>What is the main idea behind LSTM network architecture?</a:t>
+            </a:r>
+          </a:p>
+        </p:txBody>
+      </p:sp>
+      <p:sp>
+        <p:nvSpPr>
+          <p:cNvPr id="4" name="New shape"/>
+          <p:cNvSpPr/>
+          <p:nvPr/>
+        </p:nvSpPr>
+        <p:spPr>
+          <a:xfrm>
+            <a:off x="586581" y="2361438"/>
+            <a:ext cx="11018838" cy="3996944"/>
+          </a:xfrm>
+          <a:prstGeom prst="rect">
+            <a:avLst/>
+          </a:prstGeom>
+          <a:noFill/>
+          <a:ln>
+            <a:noFill/>
+          </a:ln>
+        </p:spPr>
+        <p:style>
+          <a:lnRef idx="2">
+            <a:schemeClr val="accent1">
+              <a:shade val="50000"/>
+            </a:schemeClr>
+          </a:lnRef>
+          <a:fillRef idx="1">
+            <a:schemeClr val="accent1"/>
+          </a:fillRef>
+          <a:effectRef idx="0">
+            <a:schemeClr val="accent1"/>
+          </a:effectRef>
+          <a:fontRef idx="minor">
+            <a:schemeClr val="lt1"/>
+          </a:fontRef>
+        </p:style>
+        <p:txBody>
+          <a:bodyPr wrap="square" rtlCol="0" anchor="t"/>
+          <a:lstStyle/>
+          <a:p>
+            <a:pPr lvl="1" indent="-457200">
+              <a:spcAft>
+                <a:spcPct val="15000"/>
+              </a:spcAft>
+              <a:buAutoNum type="alphaUcPeriod"/>
+            </a:pPr>
+            <a:r>
+              <a:rPr sz="2500">
+                <a:solidFill>
+                  <a:srgbClr val="000000"/>
+                </a:solidFill>
+              </a:rPr>
+              <a:t>Fixed number of LSTM blocks for the whole dataset</a:t>
+            </a:r>
+          </a:p>
+          <a:p>
+            <a:pPr lvl="1" indent="-457200">
+              <a:spcAft>
+                <a:spcPct val="15000"/>
+              </a:spcAft>
+              <a:buAutoNum type="alphaUcPeriod"/>
+            </a:pPr>
+            <a:r>
+              <a:rPr sz="2500">
+                <a:solidFill>
+                  <a:srgbClr val="000000"/>
+                </a:solidFill>
+              </a:rPr>
+              <a:t>It contains many layers of recurrent neural networks</a:t>
+            </a:r>
+          </a:p>
+          <a:p>
+            <a:pPr lvl="1" indent="-457200">
+              <a:spcAft>
+                <a:spcPct val="15000"/>
+              </a:spcAft>
+              <a:buAutoNum type="alphaUcPeriod"/>
+            </a:pPr>
+            <a:r>
+              <a:rPr sz="2500" b="1">
+                <a:solidFill>
+                  <a:srgbClr val="000000"/>
+                </a:solidFill>
+                <a:highlight>
+                  <a:srgbClr val="F0F788"/>
+                </a:highlight>
+              </a:rPr>
+              <a:t>Explicit state management with forgetting and state triggering</a:t>
+            </a:r>
+          </a:p>
+        </p:txBody>
+      </p:sp>
+    </p:spTree>
+  </p:cSld>
+  <p:clrMapOvr>
+    <a:masterClrMapping/>
+  </p:clrMapOvr>
+  <p:transition/>
+</p:sld>
+</file>
+
+<file path=ppt/slides/slide21.xml><?xml version="1.0" encoding="utf-8"?>
+<p:sld xmlns:a="http://schemas.openxmlformats.org/drawingml/2006/main" xmlns:r="http://schemas.openxmlformats.org/officeDocument/2006/relationships" xmlns:p="http://schemas.openxmlformats.org/presentationml/2006/main">
+  <p:cSld>
+    <p:spTree>
+      <p:nvGrpSpPr>
+        <p:cNvPr id="1" name=""/>
+        <p:cNvGrpSpPr/>
+        <p:nvPr/>
+      </p:nvGrpSpPr>
+      <p:grpSpPr>
+        <a:xfrm>
+          <a:off x="0" y="0"/>
+          <a:ext cx="0" cy="0"/>
+          <a:chOff x="0" y="0"/>
+          <a:chExt cx="0" cy="0"/>
+        </a:xfrm>
+      </p:grpSpPr>
+      <p:sp>
+        <p:nvSpPr>
+          <p:cNvPr id="2" name="Title"/>
+          <p:cNvSpPr>
+            <a:spLocks noGrp="1"/>
+          </p:cNvSpPr>
+          <p:nvPr>
+            <p:ph type="title"/>
+          </p:nvPr>
+        </p:nvSpPr>
+        <p:spPr>
+          <a:xfrm>
+            <a:off x="588263" y="457200"/>
+            <a:ext cx="11018520" cy="548640"/>
+          </a:xfrm>
+        </p:spPr>
+        <p:txBody>
+          <a:bodyPr/>
+          <a:lstStyle>
+            <a:lvl1pPr>
+              <a:defRPr>
+                <a:solidFill>
+                  <a:schemeClr val="tx1"/>
+                </a:solidFill>
+              </a:defRPr>
+            </a:lvl1pPr>
+          </a:lstStyle>
+          <a:p>
+            <a:r>
+              <a:rPr lang="en-US"/>
+              <a:t>Question 5</a:t>
+            </a:r>
+          </a:p>
+        </p:txBody>
+      </p:sp>
+      <p:sp>
+        <p:nvSpPr>
+          <p:cNvPr id="3" name="Subtitle"/>
+          <p:cNvSpPr>
+            <a:spLocks noGrp="1"/>
+          </p:cNvSpPr>
+          <p:nvPr>
+            <p:ph sz="quarter" idx="10"/>
+          </p:nvPr>
+        </p:nvSpPr>
+        <p:spPr>
+          <a:xfrm>
+            <a:off x="584200" y="1435100"/>
+            <a:ext cx="11018838" cy="426720"/>
+          </a:xfrm>
+        </p:spPr>
+        <p:txBody>
+          <a:bodyPr/>
+          <a:lstStyle>
+            <a:lvl1pPr marL="0" indent="0">
+              <a:buNone/>
+              <a:defRPr>
+                <a:solidFill>
+                  <a:schemeClr val="tx1"/>
+                </a:solidFill>
+              </a:defRPr>
+            </a:lvl1pPr>
+            <a:lvl2pPr>
+              <a:defRPr>
+                <a:solidFill>
+                  <a:schemeClr val="tx1"/>
+                </a:solidFill>
+              </a:defRPr>
+            </a:lvl2pPr>
+            <a:lvl3pPr>
+              <a:defRPr>
+                <a:solidFill>
+                  <a:schemeClr val="tx1"/>
+                </a:solidFill>
+              </a:defRPr>
+            </a:lvl3pPr>
+            <a:lvl4pPr>
+              <a:defRPr>
+                <a:solidFill>
+                  <a:schemeClr val="tx1"/>
+                </a:solidFill>
+              </a:defRPr>
+            </a:lvl4pPr>
+            <a:lvl5pPr>
+              <a:defRPr>
+                <a:solidFill>
+                  <a:schemeClr val="tx1"/>
+                </a:solidFill>
+              </a:defRPr>
+            </a:lvl5pPr>
+          </a:lstStyle>
+          <a:p>
+            <a:r>
+              <a:t>What is the main idea of attention?</a:t>
+            </a:r>
+          </a:p>
+        </p:txBody>
+      </p:sp>
+      <p:sp>
+        <p:nvSpPr>
+          <p:cNvPr id="4" name="New shape"/>
+          <p:cNvSpPr/>
+          <p:nvPr/>
+        </p:nvSpPr>
+        <p:spPr>
+          <a:xfrm>
+            <a:off x="586581" y="2361438"/>
+            <a:ext cx="11018838" cy="3996944"/>
+          </a:xfrm>
+          <a:prstGeom prst="rect">
+            <a:avLst/>
+          </a:prstGeom>
+          <a:noFill/>
+          <a:ln>
+            <a:noFill/>
+          </a:ln>
+        </p:spPr>
+        <p:style>
+          <a:lnRef idx="2">
+            <a:schemeClr val="accent1">
+              <a:shade val="50000"/>
+            </a:schemeClr>
+          </a:lnRef>
+          <a:fillRef idx="1">
+            <a:schemeClr val="accent1"/>
+          </a:fillRef>
+          <a:effectRef idx="0">
+            <a:schemeClr val="accent1"/>
+          </a:effectRef>
+          <a:fontRef idx="minor">
+            <a:schemeClr val="lt1"/>
+          </a:fontRef>
+        </p:style>
+        <p:txBody>
+          <a:bodyPr wrap="square" rtlCol="0" anchor="t"/>
+          <a:lstStyle/>
+          <a:p>
+            <a:pPr lvl="1" indent="-457200">
+              <a:spcAft>
+                <a:spcPct val="15000"/>
+              </a:spcAft>
+              <a:buAutoNum type="alphaUcPeriod"/>
+            </a:pPr>
+            <a:r>
+              <a:rPr sz="2500">
+                <a:solidFill>
+                  <a:srgbClr val="000000"/>
+                </a:solidFill>
+              </a:rPr>
+              <a:t>Attention assigns a weight coefficient to each word in the vocabulary to show how important it is</a:t>
+            </a:r>
+          </a:p>
+          <a:p>
+            <a:pPr lvl="1" indent="-457200">
+              <a:spcAft>
+                <a:spcPct val="15000"/>
+              </a:spcAft>
+              <a:buAutoNum type="alphaUcPeriod"/>
+            </a:pPr>
+            <a:r>
+              <a:rPr sz="2500">
+                <a:solidFill>
+                  <a:srgbClr val="000000"/>
+                </a:solidFill>
+              </a:rPr>
+              <a:t>Attention is a network layer that uses attention matrix to see how much input states from each step affect the final result.</a:t>
+            </a:r>
+          </a:p>
+          <a:p>
+            <a:pPr lvl="1" indent="-457200">
+              <a:spcAft>
+                <a:spcPct val="15000"/>
+              </a:spcAft>
+              <a:buAutoNum type="alphaUcPeriod"/>
+            </a:pPr>
+            <a:r>
+              <a:rPr sz="2500">
+                <a:solidFill>
+                  <a:srgbClr val="000000"/>
+                </a:solidFill>
+              </a:rPr>
+              <a:t>Attention builds global correlation matrix between all words in vocabulary, showing their co-occurrence</a:t>
+            </a:r>
+          </a:p>
+        </p:txBody>
+      </p:sp>
+    </p:spTree>
+  </p:cSld>
+  <p:clrMapOvr>
+    <a:masterClrMapping/>
+  </p:clrMapOvr>
+  <p:transition/>
+</p:sld>
+</file>
+
+<file path=ppt/slides/slide22.xml><?xml version="1.0" encoding="utf-8"?>
+<p:sld xmlns:a="http://schemas.openxmlformats.org/drawingml/2006/main" xmlns:r="http://schemas.openxmlformats.org/officeDocument/2006/relationships" xmlns:p="http://schemas.openxmlformats.org/presentationml/2006/main">
+  <p:cSld>
+    <p:spTree>
+      <p:nvGrpSpPr>
+        <p:cNvPr id="1" name=""/>
+        <p:cNvGrpSpPr/>
+        <p:nvPr/>
+      </p:nvGrpSpPr>
+      <p:grpSpPr>
+        <a:xfrm>
+          <a:off x="0" y="0"/>
+          <a:ext cx="0" cy="0"/>
+          <a:chOff x="0" y="0"/>
+          <a:chExt cx="0" cy="0"/>
+        </a:xfrm>
+      </p:grpSpPr>
+      <p:sp>
+        <p:nvSpPr>
+          <p:cNvPr id="2" name="Title"/>
+          <p:cNvSpPr>
+            <a:spLocks noGrp="1"/>
+          </p:cNvSpPr>
+          <p:nvPr>
+            <p:ph type="title"/>
+          </p:nvPr>
+        </p:nvSpPr>
+        <p:spPr>
+          <a:xfrm>
+            <a:off x="588263" y="457200"/>
+            <a:ext cx="11018520" cy="548640"/>
+          </a:xfrm>
+        </p:spPr>
+        <p:txBody>
+          <a:bodyPr/>
+          <a:lstStyle>
+            <a:lvl1pPr>
+              <a:defRPr>
+                <a:solidFill>
+                  <a:schemeClr val="tx1"/>
+                </a:solidFill>
+              </a:defRPr>
+            </a:lvl1pPr>
+          </a:lstStyle>
+          <a:p>
+            <a:r>
+              <a:rPr lang="en-US"/>
+              <a:t>Question 5</a:t>
+            </a:r>
+          </a:p>
+        </p:txBody>
+      </p:sp>
+      <p:sp>
+        <p:nvSpPr>
+          <p:cNvPr id="3" name="Subtitle"/>
+          <p:cNvSpPr>
+            <a:spLocks noGrp="1"/>
+          </p:cNvSpPr>
+          <p:nvPr>
+            <p:ph sz="quarter" idx="10"/>
+          </p:nvPr>
+        </p:nvSpPr>
+        <p:spPr>
+          <a:xfrm>
+            <a:off x="584200" y="1435100"/>
+            <a:ext cx="11018838" cy="426720"/>
+          </a:xfrm>
+        </p:spPr>
+        <p:txBody>
+          <a:bodyPr/>
+          <a:lstStyle>
+            <a:lvl1pPr marL="0" indent="0">
+              <a:buNone/>
+              <a:defRPr>
+                <a:solidFill>
+                  <a:schemeClr val="tx1"/>
+                </a:solidFill>
+              </a:defRPr>
+            </a:lvl1pPr>
+            <a:lvl2pPr>
+              <a:defRPr>
+                <a:solidFill>
+                  <a:schemeClr val="tx1"/>
+                </a:solidFill>
+              </a:defRPr>
+            </a:lvl2pPr>
+            <a:lvl3pPr>
+              <a:defRPr>
+                <a:solidFill>
+                  <a:schemeClr val="tx1"/>
+                </a:solidFill>
+              </a:defRPr>
+            </a:lvl3pPr>
+            <a:lvl4pPr>
+              <a:defRPr>
+                <a:solidFill>
+                  <a:schemeClr val="tx1"/>
+                </a:solidFill>
+              </a:defRPr>
+            </a:lvl4pPr>
+            <a:lvl5pPr>
+              <a:defRPr>
+                <a:solidFill>
+                  <a:schemeClr val="tx1"/>
+                </a:solidFill>
+              </a:defRPr>
+            </a:lvl5pPr>
+          </a:lstStyle>
+          <a:p>
+            <a:r>
+              <a:t>What is the main idea of attention?</a:t>
+            </a:r>
+          </a:p>
+        </p:txBody>
+      </p:sp>
+      <p:sp>
+        <p:nvSpPr>
+          <p:cNvPr id="4" name="New shape"/>
+          <p:cNvSpPr/>
+          <p:nvPr/>
+        </p:nvSpPr>
+        <p:spPr>
+          <a:xfrm>
+            <a:off x="586581" y="2361438"/>
+            <a:ext cx="11018838" cy="3996944"/>
+          </a:xfrm>
+          <a:prstGeom prst="rect">
+            <a:avLst/>
+          </a:prstGeom>
+          <a:noFill/>
+          <a:ln>
+            <a:noFill/>
+          </a:ln>
+        </p:spPr>
+        <p:style>
+          <a:lnRef idx="2">
+            <a:schemeClr val="accent1">
+              <a:shade val="50000"/>
+            </a:schemeClr>
+          </a:lnRef>
+          <a:fillRef idx="1">
+            <a:schemeClr val="accent1"/>
+          </a:fillRef>
+          <a:effectRef idx="0">
+            <a:schemeClr val="accent1"/>
+          </a:effectRef>
+          <a:fontRef idx="minor">
+            <a:schemeClr val="lt1"/>
+          </a:fontRef>
+        </p:style>
+        <p:txBody>
+          <a:bodyPr wrap="square" rtlCol="0" anchor="t"/>
+          <a:lstStyle/>
+          <a:p>
+            <a:pPr lvl="1" indent="-457200">
+              <a:spcAft>
+                <a:spcPct val="15000"/>
+              </a:spcAft>
+              <a:buAutoNum type="alphaUcPeriod"/>
+            </a:pPr>
+            <a:r>
+              <a:rPr sz="2500">
+                <a:solidFill>
+                  <a:srgbClr val="000000"/>
+                </a:solidFill>
+              </a:rPr>
+              <a:t>Attention assigns a weight coefficient to each word in the vocabulary to show how important it is</a:t>
+            </a:r>
+          </a:p>
+          <a:p>
+            <a:pPr lvl="1" indent="-457200">
+              <a:spcAft>
+                <a:spcPct val="15000"/>
+              </a:spcAft>
+              <a:buAutoNum type="alphaUcPeriod"/>
+            </a:pPr>
+            <a:r>
+              <a:rPr sz="2500" b="1">
+                <a:solidFill>
+                  <a:srgbClr val="000000"/>
+                </a:solidFill>
+                <a:highlight>
+                  <a:srgbClr val="F0F788"/>
+                </a:highlight>
+              </a:rPr>
+              <a:t>Attention is a network layer that uses attention matrix to see how much input states from each step affect the final result.</a:t>
+            </a:r>
+          </a:p>
+          <a:p>
+            <a:pPr lvl="1" indent="-457200">
+              <a:spcAft>
+                <a:spcPct val="15000"/>
+              </a:spcAft>
+              <a:buAutoNum type="alphaUcPeriod"/>
+            </a:pPr>
+            <a:r>
+              <a:rPr sz="2500">
+                <a:solidFill>
+                  <a:srgbClr val="000000"/>
+                </a:solidFill>
+              </a:rPr>
+              <a:t>Attention builds global correlation matrix between all words in vocabulary, showing their co-occurrence</a:t>
+            </a:r>
+          </a:p>
+        </p:txBody>
+      </p:sp>
+    </p:spTree>
+  </p:cSld>
+  <p:clrMapOvr>
+    <a:masterClrMapping/>
+  </p:clrMapOvr>
+  <p:transition/>
+</p:sld>
+</file>
+
+<file path=ppt/slides/slide23.xml><?xml version="1.0" encoding="utf-8"?>
+<p:sld xmlns:a="http://schemas.openxmlformats.org/drawingml/2006/main" xmlns:r="http://schemas.openxmlformats.org/officeDocument/2006/relationships" xmlns:p="http://schemas.openxmlformats.org/presentationml/2006/main">
+  <p:cSld>
+    <p:spTree>
+      <p:nvGrpSpPr>
+        <p:cNvPr id="1" name=""/>
+        <p:cNvGrpSpPr/>
+        <p:nvPr/>
+      </p:nvGrpSpPr>
+      <p:grpSpPr>
+        <a:xfrm>
+          <a:off x="0" y="0"/>
+          <a:ext cx="0" cy="0"/>
+          <a:chOff x="0" y="0"/>
+          <a:chExt cx="0" cy="0"/>
+        </a:xfrm>
+      </p:grpSpPr>
+      <p:sp>
+        <p:nvSpPr>
+          <p:cNvPr id="2" name="Title"/>
+          <p:cNvSpPr>
+            <a:spLocks noGrp="1"/>
+          </p:cNvSpPr>
+          <p:nvPr>
+            <p:ph type="title" hasCustomPrompt="1"/>
+          </p:nvPr>
+        </p:nvSpPr>
+        <p:spPr/>
+        <p:txBody>
+          <a:bodyPr wrap="square" lIns="0" tIns="0" rIns="0" bIns="0" anchor="b" anchorCtr="0">
+            <a:spAutoFit/>
+          </a:bodyPr>
+          <a:lstStyle>
+            <a:lvl1pPr algn="l" defTabSz="932742" rtl="0" eaLnBrk="1" latinLnBrk="0" hangingPunct="1">
+              <a:lnSpc>
+                <a:spcPct val="90000"/>
+              </a:lnSpc>
+              <a:spcBef>
+                <a:spcPct val="0"/>
+              </a:spcBef>
+              <a:buNone/>
+              <a:defRPr lang="en-US" sz="3600" b="0" kern="1200" cap="none" spc="-50" baseline="0">
+                <a:ln w="3175">
+                  <a:noFill/>
+                </a:ln>
+                <a:solidFill>
+                  <a:schemeClr val="tx1"/>
+                </a:solidFill>
+                <a:effectLst/>
+                <a:latin typeface="+mj-lt"/>
+                <a:ea typeface="+mn-ea"/>
+                <a:cs typeface="Segoe UI" pitchFamily="34" charset="0"/>
+              </a:defRPr>
+            </a:lvl1pPr>
+          </a:lstStyle>
+          <a:p>
+            <a:r>
+              <a:rPr lang="en-US"/>
+              <a:t>Summary</a:t>
+            </a:r>
+          </a:p>
+        </p:txBody>
+      </p:sp>
+    </p:spTree>
+  </p:cSld>
+  <p:clrMapOvr>
+    <a:masterClrMapping/>
+  </p:clrMapOvr>
+  <p:transition/>
+</p:sld>
+</file>
+
+<file path=ppt/slides/slide24.xml><?xml version="1.0" encoding="utf-8"?>
+<p:sld xmlns:a="http://schemas.openxmlformats.org/drawingml/2006/main" xmlns:r="http://schemas.openxmlformats.org/officeDocument/2006/relationships" xmlns:p="http://schemas.openxmlformats.org/presentationml/2006/main">
+  <p:cSld>
+    <p:spTree>
+      <p:nvGrpSpPr>
+        <p:cNvPr id="1" name=""/>
+        <p:cNvGrpSpPr/>
+        <p:nvPr/>
+      </p:nvGrpSpPr>
+      <p:grpSpPr>
+        <a:xfrm>
+          <a:off x="0" y="0"/>
+          <a:ext cx="0" cy="0"/>
+          <a:chOff x="0" y="0"/>
+          <a:chExt cx="0" cy="0"/>
+        </a:xfrm>
+      </p:grpSpPr>
+      <p:sp>
+        <p:nvSpPr>
+          <p:cNvPr id="2" name="Title"/>
+          <p:cNvSpPr>
+            <a:spLocks noGrp="1"/>
+          </p:cNvSpPr>
+          <p:nvPr>
+            <p:ph type="title"/>
+          </p:nvPr>
+        </p:nvSpPr>
+        <p:spPr>
+          <a:xfrm>
+            <a:off x="588263" y="457200"/>
+            <a:ext cx="11018520" cy="548640"/>
+          </a:xfrm>
+        </p:spPr>
+        <p:txBody>
+          <a:bodyPr/>
+          <a:lstStyle>
+            <a:lvl1pPr>
+              <a:defRPr>
+                <a:solidFill>
+                  <a:schemeClr val="tx1"/>
+                </a:solidFill>
+              </a:defRPr>
+            </a:lvl1pPr>
+          </a:lstStyle>
+          <a:p>
+            <a:r>
+              <a:rPr lang="en-US"/>
+              <a:t>Summary</a:t>
+            </a:r>
+          </a:p>
+        </p:txBody>
+      </p:sp>
+      <p:sp>
+        <p:nvSpPr>
+          <p:cNvPr id="3" name="Subtitle"/>
+          <p:cNvSpPr>
+            <a:spLocks noGrp="1"/>
+          </p:cNvSpPr>
+          <p:nvPr>
+            <p:ph sz="quarter" idx="10"/>
+          </p:nvPr>
+        </p:nvSpPr>
+        <p:spPr>
+          <a:xfrm>
+            <a:off x="584200" y="1435100"/>
+            <a:ext cx="11018838" cy="1280160"/>
+          </a:xfrm>
+        </p:spPr>
+        <p:txBody>
+          <a:bodyPr vert="horz" wrap="square" lIns="0" tIns="0" rIns="0" bIns="0" rtlCol="0" anchor="t">
+            <a:spAutoFit/>
+          </a:bodyPr>
+          <a:lstStyle>
+            <a:lvl1pPr marL="0" indent="0">
+              <a:buNone/>
+              <a:defRPr>
+                <a:solidFill>
+                  <a:schemeClr val="tx1"/>
+                </a:solidFill>
+              </a:defRPr>
+            </a:lvl1pPr>
+            <a:lvl2pPr>
+              <a:defRPr>
+                <a:solidFill>
+                  <a:schemeClr val="tx1"/>
+                </a:solidFill>
+              </a:defRPr>
+            </a:lvl2pPr>
+            <a:lvl3pPr>
+              <a:defRPr>
+                <a:solidFill>
+                  <a:schemeClr val="tx1"/>
+                </a:solidFill>
+              </a:defRPr>
+            </a:lvl3pPr>
+            <a:lvl4pPr>
+              <a:defRPr>
+                <a:solidFill>
+                  <a:schemeClr val="tx1"/>
+                </a:solidFill>
+              </a:defRPr>
+            </a:lvl4pPr>
+            <a:lvl5pPr>
+              <a:defRPr>
+                <a:solidFill>
+                  <a:schemeClr val="tx1"/>
+                </a:solidFill>
+              </a:defRPr>
+            </a:lvl5pPr>
+          </a:lstStyle>
+          <a:p>
+            <a:r>
+              <a:rPr lang="en-US" dirty="0">
+                <a:cs typeface="Segoe UI"/>
+              </a:rPr>
+              <a:t>We</a:t>
+            </a:r>
+            <a:r>
+              <a:rPr dirty="0">
+                <a:cs typeface="Segoe UI"/>
+              </a:rPr>
+              <a:t> have covered all the basics of Natural Language Processing such as: text representation, traditional recurrent network models, and near state-of-the-art models with attention.</a:t>
+            </a:r>
+          </a:p>
+        </p:txBody>
+      </p:sp>
+    </p:spTree>
+  </p:cSld>
+  <p:clrMapOvr>
+    <a:masterClrMapping/>
+  </p:clrMapOvr>
+  <p:transition/>
+</p:sld>
+</file>
+
+<file path=ppt/slides/slide25.xml><?xml version="1.0" encoding="utf-8"?>
+<p:sld xmlns:a="http://schemas.openxmlformats.org/drawingml/2006/main" xmlns:r="http://schemas.openxmlformats.org/officeDocument/2006/relationships" xmlns:p="http://schemas.openxmlformats.org/presentationml/2006/main">
+  <p:cSld>
+    <p:spTree>
+      <p:nvGrpSpPr>
+        <p:cNvPr id="1" name=""/>
+        <p:cNvGrpSpPr/>
+        <p:nvPr/>
+      </p:nvGrpSpPr>
+      <p:grpSpPr>
+        <a:xfrm>
+          <a:off x="0" y="0"/>
+          <a:ext cx="0" cy="0"/>
+          <a:chOff x="0" y="0"/>
+          <a:chExt cx="0" cy="0"/>
+        </a:xfrm>
+      </p:grpSpPr>
     </p:spTree>
   </p:cSld>
   <p:clrMapOvr>

</xml_diff>